<commit_message>
atualizando slides de apresentação
</commit_message>
<xml_diff>
--- a/Apresentação ANTLR.pptx
+++ b/Apresentação ANTLR.pptx
@@ -17,28 +17,30 @@
     <p:sldId id="262" r:id="rId12"/>
     <p:sldId id="263" r:id="rId13"/>
     <p:sldId id="264" r:id="rId14"/>
+    <p:sldId id="265" r:id="rId15"/>
+    <p:sldId id="266" r:id="rId16"/>
   </p:sldIdLst>
   <p:sldSz cy="5143500" cx="9144000"/>
   <p:notesSz cx="6858000" cy="9144000"/>
   <p:embeddedFontLst>
     <p:embeddedFont>
       <p:font typeface="Raleway"/>
-      <p:regular r:id="rId15"/>
-      <p:bold r:id="rId16"/>
-      <p:italic r:id="rId17"/>
-      <p:boldItalic r:id="rId18"/>
+      <p:regular r:id="rId17"/>
+      <p:bold r:id="rId18"/>
+      <p:italic r:id="rId19"/>
+      <p:boldItalic r:id="rId20"/>
     </p:embeddedFont>
     <p:embeddedFont>
       <p:font typeface="Lato"/>
-      <p:regular r:id="rId19"/>
-      <p:bold r:id="rId20"/>
-      <p:italic r:id="rId21"/>
-      <p:boldItalic r:id="rId22"/>
+      <p:regular r:id="rId21"/>
+      <p:bold r:id="rId22"/>
+      <p:italic r:id="rId23"/>
+      <p:boldItalic r:id="rId24"/>
     </p:embeddedFont>
     <p:embeddedFont>
       <p:font typeface="Oswald"/>
-      <p:regular r:id="rId23"/>
-      <p:bold r:id="rId24"/>
+      <p:regular r:id="rId25"/>
+      <p:bold r:id="rId26"/>
     </p:embeddedFont>
   </p:embeddedFontLst>
   <p:defaultTextStyle>
@@ -812,6 +814,204 @@
 </p:notes>
 </file>
 
+<file path=ppt/notesSlides/notesSlide10.xml><?xml version="1.0" encoding="utf-8"?>
+<p:notes xmlns:a="http://schemas.openxmlformats.org/drawingml/2006/main" xmlns:r="http://schemas.openxmlformats.org/officeDocument/2006/relationships" xmlns:mc="http://schemas.openxmlformats.org/markup-compatibility/2006" xmlns:mv="urn:schemas-microsoft-com:mac:vml" xmlns:p="http://schemas.openxmlformats.org/presentationml/2006/main" xmlns:c="http://schemas.openxmlformats.org/drawingml/2006/chart" xmlns:dgm="http://schemas.openxmlformats.org/drawingml/2006/diagram" xmlns:o="urn:schemas-microsoft-com:office:office" xmlns:v="urn:schemas-microsoft-com:vml" xmlns:pvml="urn:schemas-microsoft-com:office:powerpoint" xmlns:com="http://schemas.openxmlformats.org/drawingml/2006/compatibility" xmlns:p14="http://schemas.microsoft.com/office/powerpoint/2010/main" xmlns:p15="http://schemas.microsoft.com/office/powerpoint/2012/main" showMasterPhAnim="0" showMasterSp="0">
+  <p:cSld>
+    <p:spTree>
+      <p:nvGrpSpPr>
+        <p:cNvPr id="140" name="Shape 140"/>
+        <p:cNvGrpSpPr/>
+        <p:nvPr/>
+      </p:nvGrpSpPr>
+      <p:grpSpPr>
+        <a:xfrm>
+          <a:off x="0" y="0"/>
+          <a:ext cx="0" cy="0"/>
+          <a:chOff x="0" y="0"/>
+          <a:chExt cx="0" cy="0"/>
+        </a:xfrm>
+      </p:grpSpPr>
+      <p:sp>
+        <p:nvSpPr>
+          <p:cNvPr id="141" name="Google Shape;141;g453053b84f_0_1131:notes"/>
+          <p:cNvSpPr/>
+          <p:nvPr>
+            <p:ph idx="2" type="sldImg"/>
+          </p:nvPr>
+        </p:nvSpPr>
+        <p:spPr>
+          <a:xfrm>
+            <a:off x="381300" y="685800"/>
+            <a:ext cx="6096000" cy="3429000"/>
+          </a:xfrm>
+          <a:custGeom>
+            <a:rect b="b" l="l" r="r" t="t"/>
+            <a:pathLst>
+              <a:path extrusionOk="0" h="120000" w="120000">
+                <a:moveTo>
+                  <a:pt x="0" y="0"/>
+                </a:moveTo>
+                <a:lnTo>
+                  <a:pt x="120000" y="0"/>
+                </a:lnTo>
+                <a:lnTo>
+                  <a:pt x="120000" y="120000"/>
+                </a:lnTo>
+                <a:lnTo>
+                  <a:pt x="0" y="120000"/>
+                </a:lnTo>
+                <a:close/>
+              </a:path>
+            </a:pathLst>
+          </a:custGeom>
+        </p:spPr>
+      </p:sp>
+      <p:sp>
+        <p:nvSpPr>
+          <p:cNvPr id="142" name="Google Shape;142;g453053b84f_0_1131:notes"/>
+          <p:cNvSpPr txBox="1"/>
+          <p:nvPr>
+            <p:ph idx="1" type="body"/>
+          </p:nvPr>
+        </p:nvSpPr>
+        <p:spPr>
+          <a:xfrm>
+            <a:off x="685800" y="4343400"/>
+            <a:ext cx="5486400" cy="4114800"/>
+          </a:xfrm>
+          <a:prstGeom prst="rect">
+            <a:avLst/>
+          </a:prstGeom>
+        </p:spPr>
+        <p:txBody>
+          <a:bodyPr anchorCtr="0" anchor="t" bIns="91425" lIns="91425" spcFirstLastPara="1" rIns="91425" wrap="square" tIns="91425">
+            <a:noAutofit/>
+          </a:bodyPr>
+          <a:lstStyle/>
+          <a:p>
+            <a:pPr indent="0" lvl="0" marL="0" rtl="0" algn="l">
+              <a:spcBef>
+                <a:spcPts val="0"/>
+              </a:spcBef>
+              <a:spcAft>
+                <a:spcPts val="0"/>
+              </a:spcAft>
+              <a:buNone/>
+            </a:pPr>
+            <a:r>
+              <a:t/>
+            </a:r>
+            <a:endParaRPr/>
+          </a:p>
+        </p:txBody>
+      </p:sp>
+    </p:spTree>
+  </p:cSld>
+  <p:clrMapOvr>
+    <a:masterClrMapping/>
+  </p:clrMapOvr>
+</p:notes>
+</file>
+
+<file path=ppt/notesSlides/notesSlide11.xml><?xml version="1.0" encoding="utf-8"?>
+<p:notes xmlns:a="http://schemas.openxmlformats.org/drawingml/2006/main" xmlns:r="http://schemas.openxmlformats.org/officeDocument/2006/relationships" xmlns:mc="http://schemas.openxmlformats.org/markup-compatibility/2006" xmlns:mv="urn:schemas-microsoft-com:mac:vml" xmlns:p="http://schemas.openxmlformats.org/presentationml/2006/main" xmlns:c="http://schemas.openxmlformats.org/drawingml/2006/chart" xmlns:dgm="http://schemas.openxmlformats.org/drawingml/2006/diagram" xmlns:o="urn:schemas-microsoft-com:office:office" xmlns:v="urn:schemas-microsoft-com:vml" xmlns:pvml="urn:schemas-microsoft-com:office:powerpoint" xmlns:com="http://schemas.openxmlformats.org/drawingml/2006/compatibility" xmlns:p14="http://schemas.microsoft.com/office/powerpoint/2010/main" xmlns:p15="http://schemas.microsoft.com/office/powerpoint/2012/main" showMasterPhAnim="0" showMasterSp="0">
+  <p:cSld>
+    <p:spTree>
+      <p:nvGrpSpPr>
+        <p:cNvPr id="146" name="Shape 146"/>
+        <p:cNvGrpSpPr/>
+        <p:nvPr/>
+      </p:nvGrpSpPr>
+      <p:grpSpPr>
+        <a:xfrm>
+          <a:off x="0" y="0"/>
+          <a:ext cx="0" cy="0"/>
+          <a:chOff x="0" y="0"/>
+          <a:chExt cx="0" cy="0"/>
+        </a:xfrm>
+      </p:grpSpPr>
+      <p:sp>
+        <p:nvSpPr>
+          <p:cNvPr id="147" name="Google Shape;147;g453053b84f_0_1136:notes"/>
+          <p:cNvSpPr/>
+          <p:nvPr>
+            <p:ph idx="2" type="sldImg"/>
+          </p:nvPr>
+        </p:nvSpPr>
+        <p:spPr>
+          <a:xfrm>
+            <a:off x="381300" y="685800"/>
+            <a:ext cx="6096000" cy="3429000"/>
+          </a:xfrm>
+          <a:custGeom>
+            <a:rect b="b" l="l" r="r" t="t"/>
+            <a:pathLst>
+              <a:path extrusionOk="0" h="120000" w="120000">
+                <a:moveTo>
+                  <a:pt x="0" y="0"/>
+                </a:moveTo>
+                <a:lnTo>
+                  <a:pt x="120000" y="0"/>
+                </a:lnTo>
+                <a:lnTo>
+                  <a:pt x="120000" y="120000"/>
+                </a:lnTo>
+                <a:lnTo>
+                  <a:pt x="0" y="120000"/>
+                </a:lnTo>
+                <a:close/>
+              </a:path>
+            </a:pathLst>
+          </a:custGeom>
+        </p:spPr>
+      </p:sp>
+      <p:sp>
+        <p:nvSpPr>
+          <p:cNvPr id="148" name="Google Shape;148;g453053b84f_0_1136:notes"/>
+          <p:cNvSpPr txBox="1"/>
+          <p:nvPr>
+            <p:ph idx="1" type="body"/>
+          </p:nvPr>
+        </p:nvSpPr>
+        <p:spPr>
+          <a:xfrm>
+            <a:off x="685800" y="4343400"/>
+            <a:ext cx="5486400" cy="4114800"/>
+          </a:xfrm>
+          <a:prstGeom prst="rect">
+            <a:avLst/>
+          </a:prstGeom>
+        </p:spPr>
+        <p:txBody>
+          <a:bodyPr anchorCtr="0" anchor="t" bIns="91425" lIns="91425" spcFirstLastPara="1" rIns="91425" wrap="square" tIns="91425">
+            <a:noAutofit/>
+          </a:bodyPr>
+          <a:lstStyle/>
+          <a:p>
+            <a:pPr indent="0" lvl="0" marL="0" rtl="0" algn="l">
+              <a:spcBef>
+                <a:spcPts val="0"/>
+              </a:spcBef>
+              <a:spcAft>
+                <a:spcPts val="0"/>
+              </a:spcAft>
+              <a:buNone/>
+            </a:pPr>
+            <a:r>
+              <a:t/>
+            </a:r>
+            <a:endParaRPr/>
+          </a:p>
+        </p:txBody>
+      </p:sp>
+    </p:spTree>
+  </p:cSld>
+  <p:clrMapOvr>
+    <a:masterClrMapping/>
+  </p:clrMapOvr>
+</p:notes>
+</file>
+
 <file path=ppt/notesSlides/notesSlide2.xml><?xml version="1.0" encoding="utf-8"?>
 <p:notes xmlns:a="http://schemas.openxmlformats.org/drawingml/2006/main" xmlns:r="http://schemas.openxmlformats.org/officeDocument/2006/relationships" xmlns:mc="http://schemas.openxmlformats.org/markup-compatibility/2006" xmlns:mv="urn:schemas-microsoft-com:mac:vml" xmlns:p="http://schemas.openxmlformats.org/presentationml/2006/main" xmlns:c="http://schemas.openxmlformats.org/drawingml/2006/chart" xmlns:dgm="http://schemas.openxmlformats.org/drawingml/2006/diagram" xmlns:o="urn:schemas-microsoft-com:office:office" xmlns:v="urn:schemas-microsoft-com:vml" xmlns:pvml="urn:schemas-microsoft-com:office:powerpoint" xmlns:com="http://schemas.openxmlformats.org/drawingml/2006/compatibility" xmlns:p14="http://schemas.microsoft.com/office/powerpoint/2010/main" xmlns:p15="http://schemas.microsoft.com/office/powerpoint/2012/main" showMasterPhAnim="0" showMasterSp="0">
   <p:cSld>
@@ -1425,7 +1625,7 @@
       </p:grpSpPr>
       <p:sp>
         <p:nvSpPr>
-          <p:cNvPr id="129" name="Google Shape;129;g453053b84f_0_1112:notes"/>
+          <p:cNvPr id="129" name="Google Shape;129;g453053b84f_0_1126:notes"/>
           <p:cNvSpPr/>
           <p:nvPr>
             <p:ph idx="2" type="sldImg"/>
@@ -1460,7 +1660,7 @@
       </p:sp>
       <p:sp>
         <p:nvSpPr>
-          <p:cNvPr id="130" name="Google Shape;130;g453053b84f_0_1112:notes"/>
+          <p:cNvPr id="130" name="Google Shape;130;g453053b84f_0_1126:notes"/>
           <p:cNvSpPr txBox="1"/>
           <p:nvPr>
             <p:ph idx="1" type="body"/>
@@ -1510,7 +1710,7 @@
   <p:cSld>
     <p:spTree>
       <p:nvGrpSpPr>
-        <p:cNvPr id="133" name="Shape 133"/>
+        <p:cNvPr id="134" name="Shape 134"/>
         <p:cNvGrpSpPr/>
         <p:nvPr/>
       </p:nvGrpSpPr>
@@ -1524,7 +1724,7 @@
       </p:grpSpPr>
       <p:sp>
         <p:nvSpPr>
-          <p:cNvPr id="134" name="Google Shape;134;g453053b84f_0_1120:notes"/>
+          <p:cNvPr id="135" name="Google Shape;135;g453053b84f_0_1141:notes"/>
           <p:cNvSpPr/>
           <p:nvPr>
             <p:ph idx="2" type="sldImg"/>
@@ -1559,7 +1759,7 @@
       </p:sp>
       <p:sp>
         <p:nvSpPr>
-          <p:cNvPr id="135" name="Google Shape;135;g453053b84f_0_1120:notes"/>
+          <p:cNvPr id="136" name="Google Shape;136;g453053b84f_0_1141:notes"/>
           <p:cNvSpPr txBox="1"/>
           <p:nvPr>
             <p:ph idx="1" type="body"/>
@@ -8998,6 +9198,214 @@
 </p:sld>
 </file>
 
+<file path=ppt/slides/slide10.xml><?xml version="1.0" encoding="utf-8"?>
+<p:sld xmlns:a="http://schemas.openxmlformats.org/drawingml/2006/main" xmlns:r="http://schemas.openxmlformats.org/officeDocument/2006/relationships" xmlns:mc="http://schemas.openxmlformats.org/markup-compatibility/2006" xmlns:mv="urn:schemas-microsoft-com:mac:vml" xmlns:p="http://schemas.openxmlformats.org/presentationml/2006/main" xmlns:c="http://schemas.openxmlformats.org/drawingml/2006/chart" xmlns:dgm="http://schemas.openxmlformats.org/drawingml/2006/diagram" xmlns:o="urn:schemas-microsoft-com:office:office" xmlns:v="urn:schemas-microsoft-com:vml" xmlns:pvml="urn:schemas-microsoft-com:office:powerpoint" xmlns:com="http://schemas.openxmlformats.org/drawingml/2006/compatibility" xmlns:p14="http://schemas.microsoft.com/office/powerpoint/2010/main" xmlns:p15="http://schemas.microsoft.com/office/powerpoint/2012/main">
+  <p:cSld>
+    <p:spTree>
+      <p:nvGrpSpPr>
+        <p:cNvPr id="143" name="Shape 143"/>
+        <p:cNvGrpSpPr/>
+        <p:nvPr/>
+      </p:nvGrpSpPr>
+      <p:grpSpPr>
+        <a:xfrm>
+          <a:off x="0" y="0"/>
+          <a:ext cx="0" cy="0"/>
+          <a:chOff x="0" y="0"/>
+          <a:chExt cx="0" cy="0"/>
+        </a:xfrm>
+      </p:grpSpPr>
+      <p:sp>
+        <p:nvSpPr>
+          <p:cNvPr id="144" name="Google Shape;144;p23"/>
+          <p:cNvSpPr txBox="1"/>
+          <p:nvPr>
+            <p:ph type="title"/>
+          </p:nvPr>
+        </p:nvSpPr>
+        <p:spPr>
+          <a:xfrm>
+            <a:off x="729450" y="1318650"/>
+            <a:ext cx="7688700" cy="535200"/>
+          </a:xfrm>
+          <a:prstGeom prst="rect">
+            <a:avLst/>
+          </a:prstGeom>
+        </p:spPr>
+        <p:txBody>
+          <a:bodyPr anchorCtr="0" anchor="t" bIns="91425" lIns="91425" spcFirstLastPara="1" rIns="91425" wrap="square" tIns="91425">
+            <a:noAutofit/>
+          </a:bodyPr>
+          <a:lstStyle/>
+          <a:p>
+            <a:pPr indent="0" lvl="0" marL="0" rtl="0" algn="l">
+              <a:spcBef>
+                <a:spcPts val="0"/>
+              </a:spcBef>
+              <a:spcAft>
+                <a:spcPts val="0"/>
+              </a:spcAft>
+              <a:buNone/>
+            </a:pPr>
+            <a:r>
+              <a:rPr lang="pt-PT"/>
+              <a:t>Regras Léxicas</a:t>
+            </a:r>
+            <a:endParaRPr/>
+          </a:p>
+        </p:txBody>
+      </p:sp>
+      <p:sp>
+        <p:nvSpPr>
+          <p:cNvPr id="145" name="Google Shape;145;p23"/>
+          <p:cNvSpPr txBox="1"/>
+          <p:nvPr>
+            <p:ph idx="1" type="body"/>
+          </p:nvPr>
+        </p:nvSpPr>
+        <p:spPr>
+          <a:xfrm>
+            <a:off x="729450" y="2078875"/>
+            <a:ext cx="7688700" cy="2261100"/>
+          </a:xfrm>
+          <a:prstGeom prst="rect">
+            <a:avLst/>
+          </a:prstGeom>
+        </p:spPr>
+        <p:txBody>
+          <a:bodyPr anchorCtr="0" anchor="t" bIns="91425" lIns="91425" spcFirstLastPara="1" rIns="91425" wrap="square" tIns="91425">
+            <a:noAutofit/>
+          </a:bodyPr>
+          <a:lstStyle/>
+          <a:p>
+            <a:pPr indent="0" lvl="0" marL="0" rtl="0" algn="l">
+              <a:spcBef>
+                <a:spcPts val="0"/>
+              </a:spcBef>
+              <a:spcAft>
+                <a:spcPts val="1600"/>
+              </a:spcAft>
+              <a:buNone/>
+            </a:pPr>
+            <a:r>
+              <a:t/>
+            </a:r>
+            <a:endParaRPr/>
+          </a:p>
+        </p:txBody>
+      </p:sp>
+    </p:spTree>
+  </p:cSld>
+  <p:clrMapOvr>
+    <a:masterClrMapping/>
+  </p:clrMapOvr>
+</p:sld>
+</file>
+
+<file path=ppt/slides/slide11.xml><?xml version="1.0" encoding="utf-8"?>
+<p:sld xmlns:a="http://schemas.openxmlformats.org/drawingml/2006/main" xmlns:r="http://schemas.openxmlformats.org/officeDocument/2006/relationships" xmlns:mc="http://schemas.openxmlformats.org/markup-compatibility/2006" xmlns:mv="urn:schemas-microsoft-com:mac:vml" xmlns:p="http://schemas.openxmlformats.org/presentationml/2006/main" xmlns:c="http://schemas.openxmlformats.org/drawingml/2006/chart" xmlns:dgm="http://schemas.openxmlformats.org/drawingml/2006/diagram" xmlns:o="urn:schemas-microsoft-com:office:office" xmlns:v="urn:schemas-microsoft-com:vml" xmlns:pvml="urn:schemas-microsoft-com:office:powerpoint" xmlns:com="http://schemas.openxmlformats.org/drawingml/2006/compatibility" xmlns:p14="http://schemas.microsoft.com/office/powerpoint/2010/main" xmlns:p15="http://schemas.microsoft.com/office/powerpoint/2012/main">
+  <p:cSld>
+    <p:spTree>
+      <p:nvGrpSpPr>
+        <p:cNvPr id="149" name="Shape 149"/>
+        <p:cNvGrpSpPr/>
+        <p:nvPr/>
+      </p:nvGrpSpPr>
+      <p:grpSpPr>
+        <a:xfrm>
+          <a:off x="0" y="0"/>
+          <a:ext cx="0" cy="0"/>
+          <a:chOff x="0" y="0"/>
+          <a:chExt cx="0" cy="0"/>
+        </a:xfrm>
+      </p:grpSpPr>
+      <p:sp>
+        <p:nvSpPr>
+          <p:cNvPr id="150" name="Google Shape;150;p24"/>
+          <p:cNvSpPr txBox="1"/>
+          <p:nvPr>
+            <p:ph type="title"/>
+          </p:nvPr>
+        </p:nvSpPr>
+        <p:spPr>
+          <a:xfrm>
+            <a:off x="729450" y="1318650"/>
+            <a:ext cx="7688700" cy="535200"/>
+          </a:xfrm>
+          <a:prstGeom prst="rect">
+            <a:avLst/>
+          </a:prstGeom>
+        </p:spPr>
+        <p:txBody>
+          <a:bodyPr anchorCtr="0" anchor="t" bIns="91425" lIns="91425" spcFirstLastPara="1" rIns="91425" wrap="square" tIns="91425">
+            <a:noAutofit/>
+          </a:bodyPr>
+          <a:lstStyle/>
+          <a:p>
+            <a:pPr indent="0" lvl="0" marL="0" rtl="0" algn="l">
+              <a:spcBef>
+                <a:spcPts val="0"/>
+              </a:spcBef>
+              <a:spcAft>
+                <a:spcPts val="0"/>
+              </a:spcAft>
+              <a:buNone/>
+            </a:pPr>
+            <a:r>
+              <a:rPr lang="pt-PT"/>
+              <a:t>Regras do parser</a:t>
+            </a:r>
+            <a:endParaRPr/>
+          </a:p>
+        </p:txBody>
+      </p:sp>
+      <p:sp>
+        <p:nvSpPr>
+          <p:cNvPr id="151" name="Google Shape;151;p24"/>
+          <p:cNvSpPr txBox="1"/>
+          <p:nvPr>
+            <p:ph idx="1" type="body"/>
+          </p:nvPr>
+        </p:nvSpPr>
+        <p:spPr>
+          <a:xfrm>
+            <a:off x="729450" y="2078875"/>
+            <a:ext cx="7688700" cy="2261100"/>
+          </a:xfrm>
+          <a:prstGeom prst="rect">
+            <a:avLst/>
+          </a:prstGeom>
+        </p:spPr>
+        <p:txBody>
+          <a:bodyPr anchorCtr="0" anchor="t" bIns="91425" lIns="91425" spcFirstLastPara="1" rIns="91425" wrap="square" tIns="91425">
+            <a:noAutofit/>
+          </a:bodyPr>
+          <a:lstStyle/>
+          <a:p>
+            <a:pPr indent="0" lvl="0" marL="0" rtl="0" algn="l">
+              <a:spcBef>
+                <a:spcPts val="0"/>
+              </a:spcBef>
+              <a:spcAft>
+                <a:spcPts val="1600"/>
+              </a:spcAft>
+              <a:buNone/>
+            </a:pPr>
+            <a:r>
+              <a:t/>
+            </a:r>
+            <a:endParaRPr/>
+          </a:p>
+        </p:txBody>
+      </p:sp>
+    </p:spTree>
+  </p:cSld>
+  <p:clrMapOvr>
+    <a:masterClrMapping/>
+  </p:clrMapOvr>
+</p:sld>
+</file>
+
 <file path=ppt/slides/slide2.xml><?xml version="1.0" encoding="utf-8"?>
 <p:sld xmlns:a="http://schemas.openxmlformats.org/drawingml/2006/main" xmlns:r="http://schemas.openxmlformats.org/officeDocument/2006/relationships" xmlns:mc="http://schemas.openxmlformats.org/markup-compatibility/2006" xmlns:mv="urn:schemas-microsoft-com:mac:vml" xmlns:p="http://schemas.openxmlformats.org/presentationml/2006/main" xmlns:c="http://schemas.openxmlformats.org/drawingml/2006/chart" xmlns:dgm="http://schemas.openxmlformats.org/drawingml/2006/diagram" xmlns:o="urn:schemas-microsoft-com:office:office" xmlns:v="urn:schemas-microsoft-com:vml" xmlns:pvml="urn:schemas-microsoft-com:office:powerpoint" xmlns:com="http://schemas.openxmlformats.org/drawingml/2006/compatibility" xmlns:p14="http://schemas.microsoft.com/office/powerpoint/2010/main" xmlns:p15="http://schemas.microsoft.com/office/powerpoint/2012/main">
   <p:cSld>
@@ -9159,37 +9567,13 @@
               </a:rPr>
               <a:t>3 - </a:t>
             </a:r>
-            <a:endParaRPr sz="1800">
-              <a:solidFill>
-                <a:srgbClr val="000000"/>
-              </a:solidFill>
-            </a:endParaRPr>
-          </a:p>
-          <a:p>
-            <a:pPr indent="0" lvl="0" marL="0" rtl="0" algn="l">
-              <a:spcBef>
-                <a:spcPts val="0"/>
-              </a:spcBef>
-              <a:spcAft>
-                <a:spcPts val="0"/>
-              </a:spcAft>
-              <a:buNone/>
-            </a:pPr>
             <a:r>
               <a:rPr lang="pt-PT" sz="1800">
                 <a:solidFill>
                   <a:srgbClr val="000000"/>
                 </a:solidFill>
               </a:rPr>
-              <a:t>4 - Uso prático</a:t>
-            </a:r>
-            <a:r>
-              <a:rPr lang="pt-PT" sz="1800">
-                <a:solidFill>
-                  <a:srgbClr val="000000"/>
-                </a:solidFill>
-              </a:rPr>
-              <a:t> ANTLR funciona</a:t>
+              <a:t>Uso prático ANTLR funciona</a:t>
             </a:r>
             <a:endParaRPr sz="1800">
               <a:solidFill>
@@ -9704,7 +10088,7 @@
                   <a:srgbClr val="000000"/>
                 </a:solidFill>
               </a:rPr>
-              <a:t>Gramática formal</a:t>
+              <a:t>Gramática</a:t>
             </a:r>
             <a:endParaRPr>
               <a:solidFill>
@@ -9772,7 +10156,8 @@
               <a:buNone/>
             </a:pPr>
             <a:r>
-              <a:t/>
+              <a:rPr lang="pt-PT"/>
+              <a:t>Gramática formal</a:t>
             </a:r>
             <a:endParaRPr/>
           </a:p>
@@ -9801,19 +10186,108 @@
           </a:bodyPr>
           <a:lstStyle/>
           <a:p>
-            <a:pPr indent="0" lvl="0" marL="0" rtl="0" algn="l">
-              <a:spcBef>
-                <a:spcPts val="0"/>
-              </a:spcBef>
-              <a:spcAft>
-                <a:spcPts val="1600"/>
-              </a:spcAft>
-              <a:buNone/>
+            <a:pPr indent="-311150" lvl="0" marL="457200" rtl="0" algn="l">
+              <a:spcBef>
+                <a:spcPts val="0"/>
+              </a:spcBef>
+              <a:spcAft>
+                <a:spcPts val="0"/>
+              </a:spcAft>
+              <a:buClr>
+                <a:srgbClr val="000000"/>
+              </a:buClr>
+              <a:buSzPts val="1300"/>
+              <a:buChar char="-"/>
             </a:pPr>
             <a:r>
-              <a:t/>
+              <a:rPr lang="pt-PT">
+                <a:solidFill>
+                  <a:srgbClr val="000000"/>
+                </a:solidFill>
+              </a:rPr>
+              <a:t>uma </a:t>
             </a:r>
-            <a:endParaRPr/>
+            <a:r>
+              <a:rPr lang="pt-PT">
+                <a:solidFill>
+                  <a:srgbClr val="000000"/>
+                </a:solidFill>
+              </a:rPr>
+              <a:t>gramática</a:t>
+            </a:r>
+            <a:r>
+              <a:rPr lang="pt-PT">
+                <a:solidFill>
+                  <a:srgbClr val="000000"/>
+                </a:solidFill>
+              </a:rPr>
+              <a:t> formal é um conjunto de regras de formação de cadeias, estas regras descrevem como formar cadeias, que são válidas de acordo com a sintaxe da linguagem, </a:t>
+            </a:r>
+            <a:endParaRPr>
+              <a:solidFill>
+                <a:srgbClr val="000000"/>
+              </a:solidFill>
+            </a:endParaRPr>
+          </a:p>
+          <a:p>
+            <a:pPr indent="-311150" lvl="0" marL="457200" rtl="0" algn="l">
+              <a:spcBef>
+                <a:spcPts val="0"/>
+              </a:spcBef>
+              <a:spcAft>
+                <a:spcPts val="0"/>
+              </a:spcAft>
+              <a:buClr>
+                <a:srgbClr val="000000"/>
+              </a:buClr>
+              <a:buSzPts val="1300"/>
+              <a:buChar char="-"/>
+            </a:pPr>
+            <a:r>
+              <a:rPr lang="pt-PT">
+                <a:solidFill>
+                  <a:srgbClr val="000000"/>
+                </a:solidFill>
+              </a:rPr>
+              <a:t>importante lembrar que ao formar uma gramática, esta não atribui </a:t>
+            </a:r>
+            <a:r>
+              <a:rPr lang="pt-PT">
+                <a:solidFill>
+                  <a:srgbClr val="000000"/>
+                </a:solidFill>
+              </a:rPr>
+              <a:t>sentido</a:t>
+            </a:r>
+            <a:r>
+              <a:rPr lang="pt-PT">
+                <a:solidFill>
+                  <a:srgbClr val="000000"/>
+                </a:solidFill>
+              </a:rPr>
+              <a:t> (ou semântica) a linguagem, apenas </a:t>
+            </a:r>
+            <a:r>
+              <a:rPr lang="pt-PT">
+                <a:solidFill>
+                  <a:srgbClr val="000000"/>
+                </a:solidFill>
+              </a:rPr>
+              <a:t>valida</a:t>
+            </a:r>
+            <a:r>
+              <a:rPr lang="pt-PT">
+                <a:solidFill>
+                  <a:srgbClr val="000000"/>
+                </a:solidFill>
+              </a:rPr>
+              <a:t> a sintaxe.</a:t>
+            </a:r>
+            <a:endParaRPr>
+              <a:solidFill>
+                <a:srgbClr val="000000"/>
+              </a:solidFill>
+            </a:endParaRPr>
           </a:p>
         </p:txBody>
       </p:sp>
@@ -9852,8 +10326,8 @@
         </p:nvSpPr>
         <p:spPr>
           <a:xfrm>
-            <a:off x="729450" y="1322450"/>
-            <a:ext cx="7688400" cy="1518600"/>
+            <a:off x="729450" y="1318650"/>
+            <a:ext cx="7688700" cy="535200"/>
           </a:xfrm>
           <a:prstGeom prst="rect">
             <a:avLst/>
@@ -9875,12 +10349,180 @@
               <a:buNone/>
             </a:pPr>
             <a:r>
+              <a:rPr lang="pt-PT"/>
+              <a:t>Abordagens para criar uma gramática</a:t>
+            </a:r>
+            <a:endParaRPr/>
+          </a:p>
+        </p:txBody>
+      </p:sp>
+      <p:sp>
+        <p:nvSpPr>
+          <p:cNvPr id="133" name="Google Shape;133;p21"/>
+          <p:cNvSpPr txBox="1"/>
+          <p:nvPr>
+            <p:ph idx="1" type="body"/>
+          </p:nvPr>
+        </p:nvSpPr>
+        <p:spPr>
+          <a:xfrm>
+            <a:off x="729450" y="2078875"/>
+            <a:ext cx="7688700" cy="2261100"/>
+          </a:xfrm>
+          <a:prstGeom prst="rect">
+            <a:avLst/>
+          </a:prstGeom>
+        </p:spPr>
+        <p:txBody>
+          <a:bodyPr anchorCtr="0" anchor="t" bIns="91425" lIns="91425" spcFirstLastPara="1" rIns="91425" wrap="square" tIns="91425">
+            <a:noAutofit/>
+          </a:bodyPr>
+          <a:lstStyle/>
+          <a:p>
+            <a:pPr indent="0" lvl="0" marL="0" rtl="0" algn="l">
+              <a:spcBef>
+                <a:spcPts val="0"/>
+              </a:spcBef>
+              <a:spcAft>
+                <a:spcPts val="0"/>
+              </a:spcAft>
+              <a:buNone/>
+            </a:pPr>
+            <a:r>
+              <a:rPr b="1" lang="pt-PT" sz="1400">
+                <a:solidFill>
+                  <a:srgbClr val="000000"/>
+                </a:solidFill>
+              </a:rPr>
+              <a:t>Top Down (de cima para baixo): </a:t>
+            </a:r>
+            <a:endParaRPr b="1" sz="1400">
+              <a:solidFill>
+                <a:srgbClr val="000000"/>
+              </a:solidFill>
+            </a:endParaRPr>
+          </a:p>
+          <a:p>
+            <a:pPr indent="-311150" lvl="0" marL="457200" rtl="0" algn="l">
+              <a:spcBef>
+                <a:spcPts val="1600"/>
+              </a:spcBef>
+              <a:spcAft>
+                <a:spcPts val="0"/>
+              </a:spcAft>
+              <a:buClr>
+                <a:srgbClr val="000000"/>
+              </a:buClr>
+              <a:buSzPts val="1300"/>
+              <a:buChar char="-"/>
+            </a:pPr>
+            <a:r>
               <a:rPr lang="pt-PT">
                 <a:solidFill>
                   <a:srgbClr val="000000"/>
                 </a:solidFill>
               </a:rPr>
-              <a:t>Funcionamento do ANTLR</a:t>
+              <a:t>Define regras de seções e organização do arquivo primeiro</a:t>
+            </a:r>
+            <a:endParaRPr>
+              <a:solidFill>
+                <a:srgbClr val="000000"/>
+              </a:solidFill>
+            </a:endParaRPr>
+          </a:p>
+          <a:p>
+            <a:pPr indent="-311150" lvl="0" marL="457200" rtl="0" algn="l">
+              <a:spcBef>
+                <a:spcPts val="0"/>
+              </a:spcBef>
+              <a:spcAft>
+                <a:spcPts val="0"/>
+              </a:spcAft>
+              <a:buClr>
+                <a:srgbClr val="000000"/>
+              </a:buClr>
+              <a:buSzPts val="1300"/>
+              <a:buChar char="-"/>
+            </a:pPr>
+            <a:r>
+              <a:rPr lang="pt-PT">
+                <a:solidFill>
+                  <a:srgbClr val="000000"/>
+                </a:solidFill>
+              </a:rPr>
+              <a:t>regras mais baixo nível depois</a:t>
+            </a:r>
+            <a:endParaRPr>
+              <a:solidFill>
+                <a:srgbClr val="000000"/>
+              </a:solidFill>
+            </a:endParaRPr>
+          </a:p>
+          <a:p>
+            <a:pPr indent="-311150" lvl="0" marL="457200" rtl="0" algn="l">
+              <a:spcBef>
+                <a:spcPts val="0"/>
+              </a:spcBef>
+              <a:spcAft>
+                <a:spcPts val="0"/>
+              </a:spcAft>
+              <a:buClr>
+                <a:srgbClr val="000000"/>
+              </a:buClr>
+              <a:buSzPts val="1300"/>
+              <a:buChar char="-"/>
+            </a:pPr>
+            <a:r>
+              <a:rPr lang="pt-PT">
+                <a:solidFill>
+                  <a:srgbClr val="000000"/>
+                </a:solidFill>
+              </a:rPr>
+              <a:t>definição dos tokens(a menor parte) por último</a:t>
+            </a:r>
+            <a:endParaRPr>
+              <a:solidFill>
+                <a:srgbClr val="000000"/>
+              </a:solidFill>
+            </a:endParaRPr>
+          </a:p>
+          <a:p>
+            <a:pPr indent="-311150" lvl="0" marL="457200" rtl="0" algn="l">
+              <a:spcBef>
+                <a:spcPts val="0"/>
+              </a:spcBef>
+              <a:spcAft>
+                <a:spcPts val="0"/>
+              </a:spcAft>
+              <a:buClr>
+                <a:srgbClr val="000000"/>
+              </a:buClr>
+              <a:buSzPts val="1300"/>
+              <a:buChar char="-"/>
+            </a:pPr>
+            <a:r>
+              <a:rPr lang="pt-PT">
+                <a:solidFill>
+                  <a:srgbClr val="000000"/>
+                </a:solidFill>
+              </a:rPr>
+              <a:t>necessário conhecimento </a:t>
+            </a:r>
+            <a:r>
+              <a:rPr lang="pt-PT">
+                <a:solidFill>
+                  <a:srgbClr val="000000"/>
+                </a:solidFill>
+              </a:rPr>
+              <a:t>teórico</a:t>
+            </a:r>
+            <a:r>
+              <a:rPr lang="pt-PT">
+                <a:solidFill>
+                  <a:srgbClr val="000000"/>
+                </a:solidFill>
+              </a:rPr>
+              <a:t> sobre o arquivo que está sendo trabalhado</a:t>
             </a:r>
             <a:endParaRPr>
               <a:solidFill>
@@ -9903,7 +10545,7 @@
   <p:cSld>
     <p:spTree>
       <p:nvGrpSpPr>
-        <p:cNvPr id="136" name="Shape 136"/>
+        <p:cNvPr id="137" name="Shape 137"/>
         <p:cNvGrpSpPr/>
         <p:nvPr/>
       </p:nvGrpSpPr>
@@ -9917,7 +10559,7 @@
       </p:grpSpPr>
       <p:sp>
         <p:nvSpPr>
-          <p:cNvPr id="137" name="Google Shape;137;p22"/>
+          <p:cNvPr id="138" name="Google Shape;138;p22"/>
           <p:cNvSpPr txBox="1"/>
           <p:nvPr>
             <p:ph type="title"/>
@@ -9948,7 +10590,8 @@
               <a:buNone/>
             </a:pPr>
             <a:r>
-              <a:t/>
+              <a:rPr lang="pt-PT"/>
+              <a:t>Abordagens para criar uma gramática</a:t>
             </a:r>
             <a:endParaRPr/>
           </a:p>
@@ -9956,7 +10599,7 @@
       </p:sp>
       <p:sp>
         <p:nvSpPr>
-          <p:cNvPr id="138" name="Google Shape;138;p22"/>
+          <p:cNvPr id="139" name="Google Shape;139;p22"/>
           <p:cNvSpPr txBox="1"/>
           <p:nvPr>
             <p:ph idx="1" type="body"/>
@@ -9982,14 +10625,171 @@
                 <a:spcPts val="0"/>
               </a:spcBef>
               <a:spcAft>
-                <a:spcPts val="1600"/>
+                <a:spcPts val="0"/>
               </a:spcAft>
               <a:buNone/>
             </a:pPr>
             <a:r>
-              <a:t/>
+              <a:rPr b="1" lang="pt-PT" sz="1400">
+                <a:solidFill>
+                  <a:srgbClr val="000000"/>
+                </a:solidFill>
+              </a:rPr>
+              <a:t>Bottom up</a:t>
             </a:r>
-            <a:endParaRPr/>
+            <a:r>
+              <a:rPr b="1" lang="pt-PT" sz="1400">
+                <a:solidFill>
+                  <a:srgbClr val="000000"/>
+                </a:solidFill>
+              </a:rPr>
+              <a:t> (de baixo para cima): </a:t>
+            </a:r>
+            <a:endParaRPr b="1" sz="1400">
+              <a:solidFill>
+                <a:srgbClr val="000000"/>
+              </a:solidFill>
+            </a:endParaRPr>
+          </a:p>
+          <a:p>
+            <a:pPr indent="-311150" lvl="0" marL="457200" rtl="0" algn="l">
+              <a:spcBef>
+                <a:spcPts val="1600"/>
+              </a:spcBef>
+              <a:spcAft>
+                <a:spcPts val="0"/>
+              </a:spcAft>
+              <a:buClr>
+                <a:srgbClr val="000000"/>
+              </a:buClr>
+              <a:buSzPts val="1300"/>
+              <a:buChar char="-"/>
+            </a:pPr>
+            <a:r>
+              <a:rPr lang="pt-PT">
+                <a:solidFill>
+                  <a:srgbClr val="000000"/>
+                </a:solidFill>
+              </a:rPr>
+              <a:t>Define primeiro os tokens, como vão ser capturados, como são agrupados</a:t>
+            </a:r>
+            <a:endParaRPr>
+              <a:solidFill>
+                <a:srgbClr val="000000"/>
+              </a:solidFill>
+            </a:endParaRPr>
+          </a:p>
+          <a:p>
+            <a:pPr indent="-311150" lvl="0" marL="457200" rtl="0" algn="l">
+              <a:spcBef>
+                <a:spcPts val="0"/>
+              </a:spcBef>
+              <a:spcAft>
+                <a:spcPts val="0"/>
+              </a:spcAft>
+              <a:buClr>
+                <a:srgbClr val="000000"/>
+              </a:buClr>
+              <a:buSzPts val="1300"/>
+              <a:buChar char="-"/>
+            </a:pPr>
+            <a:r>
+              <a:rPr lang="pt-PT">
+                <a:solidFill>
+                  <a:srgbClr val="000000"/>
+                </a:solidFill>
+              </a:rPr>
+              <a:t>aos poucos definindo expressões básicas sobre eles</a:t>
+            </a:r>
+            <a:endParaRPr>
+              <a:solidFill>
+                <a:srgbClr val="000000"/>
+              </a:solidFill>
+            </a:endParaRPr>
+          </a:p>
+          <a:p>
+            <a:pPr indent="-311150" lvl="0" marL="457200" rtl="0" algn="l">
+              <a:spcBef>
+                <a:spcPts val="0"/>
+              </a:spcBef>
+              <a:spcAft>
+                <a:spcPts val="0"/>
+              </a:spcAft>
+              <a:buClr>
+                <a:srgbClr val="000000"/>
+              </a:buClr>
+              <a:buSzPts val="1300"/>
+              <a:buChar char="-"/>
+            </a:pPr>
+            <a:r>
+              <a:rPr lang="pt-PT">
+                <a:solidFill>
+                  <a:srgbClr val="000000"/>
+                </a:solidFill>
+              </a:rPr>
+              <a:t>por último nos preocupamos com organização de arquivo</a:t>
+            </a:r>
+            <a:endParaRPr>
+              <a:solidFill>
+                <a:srgbClr val="000000"/>
+              </a:solidFill>
+            </a:endParaRPr>
+          </a:p>
+          <a:p>
+            <a:pPr indent="-311150" lvl="0" marL="457200" rtl="0" algn="l">
+              <a:spcBef>
+                <a:spcPts val="0"/>
+              </a:spcBef>
+              <a:spcAft>
+                <a:spcPts val="0"/>
+              </a:spcAft>
+              <a:buClr>
+                <a:srgbClr val="000000"/>
+              </a:buClr>
+              <a:buSzPts val="1300"/>
+              <a:buChar char="-"/>
+            </a:pPr>
+            <a:r>
+              <a:rPr lang="pt-PT">
+                <a:solidFill>
+                  <a:srgbClr val="000000"/>
+                </a:solidFill>
+              </a:rPr>
+              <a:t>mais intuitivo</a:t>
+            </a:r>
+            <a:endParaRPr>
+              <a:solidFill>
+                <a:srgbClr val="000000"/>
+              </a:solidFill>
+            </a:endParaRPr>
+          </a:p>
+          <a:p>
+            <a:pPr indent="-311150" lvl="0" marL="457200" rtl="0" algn="l">
+              <a:spcBef>
+                <a:spcPts val="0"/>
+              </a:spcBef>
+              <a:spcAft>
+                <a:spcPts val="0"/>
+              </a:spcAft>
+              <a:buClr>
+                <a:srgbClr val="000000"/>
+              </a:buClr>
+              <a:buSzPts val="1300"/>
+              <a:buChar char="-"/>
+            </a:pPr>
+            <a:r>
+              <a:rPr lang="pt-PT">
+                <a:solidFill>
+                  <a:srgbClr val="000000"/>
+                </a:solidFill>
+              </a:rPr>
+              <a:t>pode necessitar refatoração para poder cumprir os objetivos</a:t>
+            </a:r>
+            <a:endParaRPr>
+              <a:solidFill>
+                <a:srgbClr val="000000"/>
+              </a:solidFill>
+            </a:endParaRPr>
           </a:p>
         </p:txBody>
       </p:sp>

</xml_diff>

<commit_message>
slides de regras lexicas e do parser
</commit_message>
<xml_diff>
--- a/Apresentação ANTLR.pptx
+++ b/Apresentação ANTLR.pptx
@@ -9278,19 +9278,204 @@
           </a:bodyPr>
           <a:lstStyle/>
           <a:p>
-            <a:pPr indent="0" lvl="0" marL="0" rtl="0" algn="l">
-              <a:spcBef>
-                <a:spcPts val="0"/>
-              </a:spcBef>
-              <a:spcAft>
-                <a:spcPts val="1600"/>
-              </a:spcAft>
-              <a:buNone/>
+            <a:pPr indent="-311150" lvl="0" marL="457200" rtl="0" algn="l">
+              <a:spcBef>
+                <a:spcPts val="0"/>
+              </a:spcBef>
+              <a:spcAft>
+                <a:spcPts val="0"/>
+              </a:spcAft>
+              <a:buClr>
+                <a:srgbClr val="000000"/>
+              </a:buClr>
+              <a:buSzPts val="1300"/>
+              <a:buChar char="-"/>
             </a:pPr>
             <a:r>
-              <a:t/>
+              <a:rPr lang="pt-PT">
+                <a:solidFill>
+                  <a:srgbClr val="000000"/>
+                </a:solidFill>
+              </a:rPr>
+              <a:t>Primeiro vamos definir as regras léxicas para uma calculadora</a:t>
             </a:r>
-            <a:endParaRPr/>
+            <a:endParaRPr>
+              <a:solidFill>
+                <a:srgbClr val="000000"/>
+              </a:solidFill>
+            </a:endParaRPr>
+          </a:p>
+          <a:p>
+            <a:pPr indent="-311150" lvl="0" marL="457200" rtl="0" algn="l">
+              <a:spcBef>
+                <a:spcPts val="0"/>
+              </a:spcBef>
+              <a:spcAft>
+                <a:spcPts val="0"/>
+              </a:spcAft>
+              <a:buClr>
+                <a:srgbClr val="000000"/>
+              </a:buClr>
+              <a:buSzPts val="1300"/>
+              <a:buChar char="-"/>
+            </a:pPr>
+            <a:r>
+              <a:rPr lang="pt-PT">
+                <a:solidFill>
+                  <a:srgbClr val="000000"/>
+                </a:solidFill>
+              </a:rPr>
+              <a:t>os tokens serão: número, operando e </a:t>
+            </a:r>
+            <a:r>
+              <a:rPr lang="pt-PT">
+                <a:solidFill>
+                  <a:srgbClr val="000000"/>
+                </a:solidFill>
+              </a:rPr>
+              <a:t>parênteses</a:t>
+            </a:r>
+            <a:endParaRPr>
+              <a:solidFill>
+                <a:srgbClr val="000000"/>
+              </a:solidFill>
+            </a:endParaRPr>
+          </a:p>
+          <a:p>
+            <a:pPr indent="-311150" lvl="0" marL="457200" rtl="0" algn="l">
+              <a:spcBef>
+                <a:spcPts val="0"/>
+              </a:spcBef>
+              <a:spcAft>
+                <a:spcPts val="0"/>
+              </a:spcAft>
+              <a:buClr>
+                <a:srgbClr val="000000"/>
+              </a:buClr>
+              <a:buSzPts val="1300"/>
+              <a:buChar char="-"/>
+            </a:pPr>
+            <a:r>
+              <a:rPr lang="pt-PT">
+                <a:solidFill>
+                  <a:srgbClr val="000000"/>
+                </a:solidFill>
+              </a:rPr>
+              <a:t>para abreviar :  INT, op e parent</a:t>
+            </a:r>
+            <a:endParaRPr>
+              <a:solidFill>
+                <a:srgbClr val="000000"/>
+              </a:solidFill>
+            </a:endParaRPr>
+          </a:p>
+          <a:p>
+            <a:pPr indent="-311150" lvl="0" marL="457200" rtl="0" algn="l">
+              <a:spcBef>
+                <a:spcPts val="0"/>
+              </a:spcBef>
+              <a:spcAft>
+                <a:spcPts val="0"/>
+              </a:spcAft>
+              <a:buClr>
+                <a:srgbClr val="000000"/>
+              </a:buClr>
+              <a:buSzPts val="1300"/>
+              <a:buChar char="-"/>
+            </a:pPr>
+            <a:r>
+              <a:rPr lang="pt-PT">
+                <a:solidFill>
+                  <a:srgbClr val="000000"/>
+                </a:solidFill>
+              </a:rPr>
+              <a:t>INT : (‘0’...’9’)+ ;   aqui representamos que INT pode ser qualquer </a:t>
+            </a:r>
+            <a:r>
+              <a:rPr lang="pt-PT">
+                <a:solidFill>
+                  <a:srgbClr val="000000"/>
+                </a:solidFill>
+              </a:rPr>
+              <a:t>dígito</a:t>
+            </a:r>
+            <a:r>
+              <a:rPr lang="pt-PT">
+                <a:solidFill>
+                  <a:srgbClr val="000000"/>
+                </a:solidFill>
+              </a:rPr>
+              <a:t> e pode conter vários </a:t>
+            </a:r>
+            <a:r>
+              <a:rPr lang="pt-PT">
+                <a:solidFill>
+                  <a:srgbClr val="000000"/>
+                </a:solidFill>
+              </a:rPr>
+              <a:t>dígitos</a:t>
+            </a:r>
+            <a:endParaRPr>
+              <a:solidFill>
+                <a:srgbClr val="000000"/>
+              </a:solidFill>
+            </a:endParaRPr>
+          </a:p>
+          <a:p>
+            <a:pPr indent="-311150" lvl="0" marL="457200" rtl="0" algn="l">
+              <a:spcBef>
+                <a:spcPts val="0"/>
+              </a:spcBef>
+              <a:spcAft>
+                <a:spcPts val="0"/>
+              </a:spcAft>
+              <a:buClr>
+                <a:srgbClr val="000000"/>
+              </a:buClr>
+              <a:buSzPts val="1300"/>
+              <a:buChar char="-"/>
+            </a:pPr>
+            <a:r>
+              <a:rPr lang="pt-PT">
+                <a:solidFill>
+                  <a:srgbClr val="000000"/>
+                </a:solidFill>
+              </a:rPr>
+              <a:t>op : (‘+’ , ‘-’ , ‘*’ , ‘/’) ;  assim representamos as 4 operações da tabuada</a:t>
+            </a:r>
+            <a:endParaRPr>
+              <a:solidFill>
+                <a:srgbClr val="000000"/>
+              </a:solidFill>
+            </a:endParaRPr>
+          </a:p>
+          <a:p>
+            <a:pPr indent="-311150" lvl="0" marL="457200" rtl="0" algn="l">
+              <a:spcBef>
+                <a:spcPts val="0"/>
+              </a:spcBef>
+              <a:spcAft>
+                <a:spcPts val="0"/>
+              </a:spcAft>
+              <a:buClr>
+                <a:srgbClr val="000000"/>
+              </a:buClr>
+              <a:buSzPts val="1300"/>
+              <a:buChar char="-"/>
+            </a:pPr>
+            <a:r>
+              <a:rPr lang="pt-PT">
+                <a:solidFill>
+                  <a:srgbClr val="000000"/>
+                </a:solidFill>
+              </a:rPr>
+              <a:t>parent : (‘(‘ , ‘)’) ; e para finalizar, representando abrir e fechar de parênteses</a:t>
+            </a:r>
+            <a:endParaRPr>
+              <a:solidFill>
+                <a:srgbClr val="000000"/>
+              </a:solidFill>
+            </a:endParaRPr>
           </a:p>
         </p:txBody>
       </p:sp>
@@ -9369,8 +9554,8 @@
         </p:nvSpPr>
         <p:spPr>
           <a:xfrm>
-            <a:off x="729450" y="2078875"/>
-            <a:ext cx="7688700" cy="2261100"/>
+            <a:off x="727650" y="2078877"/>
+            <a:ext cx="7688700" cy="2532300"/>
           </a:xfrm>
           <a:prstGeom prst="rect">
             <a:avLst/>
@@ -9382,22 +9567,266 @@
           </a:bodyPr>
           <a:lstStyle/>
           <a:p>
-            <a:pPr indent="0" lvl="0" marL="0" rtl="0" algn="l">
-              <a:spcBef>
-                <a:spcPts val="0"/>
-              </a:spcBef>
-              <a:spcAft>
-                <a:spcPts val="1600"/>
-              </a:spcAft>
-              <a:buNone/>
+            <a:pPr indent="-311150" lvl="0" marL="457200" rtl="0" algn="l">
+              <a:spcBef>
+                <a:spcPts val="0"/>
+              </a:spcBef>
+              <a:spcAft>
+                <a:spcPts val="0"/>
+              </a:spcAft>
+              <a:buClr>
+                <a:srgbClr val="000000"/>
+              </a:buClr>
+              <a:buSzPts val="1300"/>
+              <a:buChar char="-"/>
             </a:pPr>
             <a:r>
-              <a:t/>
+              <a:rPr lang="pt-PT">
+                <a:solidFill>
+                  <a:srgbClr val="000000"/>
+                </a:solidFill>
+              </a:rPr>
+              <a:t>Para representar a calculadora, vamos colocar uma seção</a:t>
             </a:r>
-            <a:endParaRPr/>
+            <a:br>
+              <a:rPr lang="pt-PT">
+                <a:solidFill>
+                  <a:srgbClr val="000000"/>
+                </a:solidFill>
+              </a:rPr>
+            </a:br>
+            <a:r>
+              <a:rPr lang="pt-PT">
+                <a:solidFill>
+                  <a:srgbClr val="000000"/>
+                </a:solidFill>
+              </a:rPr>
+              <a:t>prog (de programa).</a:t>
+            </a:r>
+            <a:endParaRPr>
+              <a:solidFill>
+                <a:srgbClr val="000000"/>
+              </a:solidFill>
+            </a:endParaRPr>
+          </a:p>
+          <a:p>
+            <a:pPr indent="-311150" lvl="0" marL="457200" rtl="0" algn="l">
+              <a:spcBef>
+                <a:spcPts val="0"/>
+              </a:spcBef>
+              <a:spcAft>
+                <a:spcPts val="0"/>
+              </a:spcAft>
+              <a:buClr>
+                <a:srgbClr val="000000"/>
+              </a:buClr>
+              <a:buSzPts val="1300"/>
+              <a:buChar char="-"/>
+            </a:pPr>
+            <a:r>
+              <a:rPr lang="pt-PT">
+                <a:solidFill>
+                  <a:srgbClr val="000000"/>
+                </a:solidFill>
+              </a:rPr>
+              <a:t>prog será composto de uma expressão expr, aqui </a:t>
+            </a:r>
+            <a:br>
+              <a:rPr lang="pt-PT">
+                <a:solidFill>
+                  <a:srgbClr val="000000"/>
+                </a:solidFill>
+              </a:rPr>
+            </a:br>
+            <a:r>
+              <a:rPr lang="pt-PT">
+                <a:solidFill>
+                  <a:srgbClr val="000000"/>
+                </a:solidFill>
+              </a:rPr>
+              <a:t>colocaremos a lógica de uma expressão </a:t>
+            </a:r>
+            <a:r>
+              <a:rPr lang="pt-PT">
+                <a:solidFill>
+                  <a:srgbClr val="000000"/>
+                </a:solidFill>
+              </a:rPr>
+              <a:t>matemática</a:t>
+            </a:r>
+            <a:r>
+              <a:rPr lang="pt-PT">
+                <a:solidFill>
+                  <a:srgbClr val="000000"/>
+                </a:solidFill>
+              </a:rPr>
+              <a:t>.</a:t>
+            </a:r>
+            <a:endParaRPr>
+              <a:solidFill>
+                <a:srgbClr val="000000"/>
+              </a:solidFill>
+            </a:endParaRPr>
+          </a:p>
+          <a:p>
+            <a:pPr indent="-311150" lvl="0" marL="457200" rtl="0" algn="l">
+              <a:spcBef>
+                <a:spcPts val="0"/>
+              </a:spcBef>
+              <a:spcAft>
+                <a:spcPts val="0"/>
+              </a:spcAft>
+              <a:buClr>
+                <a:srgbClr val="000000"/>
+              </a:buClr>
+              <a:buSzPts val="1300"/>
+              <a:buChar char="-"/>
+            </a:pPr>
+            <a:r>
+              <a:rPr lang="pt-PT">
+                <a:solidFill>
+                  <a:srgbClr val="000000"/>
+                </a:solidFill>
+              </a:rPr>
+              <a:t>primeiro uma expr pode ser composta de duas expr</a:t>
+            </a:r>
+            <a:br>
+              <a:rPr lang="pt-PT">
+                <a:solidFill>
+                  <a:srgbClr val="000000"/>
+                </a:solidFill>
+              </a:rPr>
+            </a:br>
+            <a:r>
+              <a:rPr lang="pt-PT">
+                <a:solidFill>
+                  <a:srgbClr val="000000"/>
+                </a:solidFill>
+              </a:rPr>
+              <a:t>separadas por um operador op</a:t>
+            </a:r>
+            <a:endParaRPr>
+              <a:solidFill>
+                <a:srgbClr val="000000"/>
+              </a:solidFill>
+            </a:endParaRPr>
+          </a:p>
+          <a:p>
+            <a:pPr indent="-311150" lvl="0" marL="457200" rtl="0" algn="l">
+              <a:spcBef>
+                <a:spcPts val="0"/>
+              </a:spcBef>
+              <a:spcAft>
+                <a:spcPts val="0"/>
+              </a:spcAft>
+              <a:buClr>
+                <a:srgbClr val="000000"/>
+              </a:buClr>
+              <a:buSzPts val="1300"/>
+              <a:buChar char="-"/>
+            </a:pPr>
+            <a:r>
+              <a:rPr lang="pt-PT">
+                <a:solidFill>
+                  <a:srgbClr val="000000"/>
+                </a:solidFill>
+              </a:rPr>
+              <a:t>uma expr também pode ser composta de uma expr entre</a:t>
+            </a:r>
+            <a:br>
+              <a:rPr lang="pt-PT">
+                <a:solidFill>
+                  <a:srgbClr val="000000"/>
+                </a:solidFill>
+              </a:rPr>
+            </a:br>
+            <a:r>
+              <a:rPr lang="pt-PT">
+                <a:solidFill>
+                  <a:srgbClr val="000000"/>
+                </a:solidFill>
+              </a:rPr>
+              <a:t>parênteses parent</a:t>
+            </a:r>
+            <a:endParaRPr>
+              <a:solidFill>
+                <a:srgbClr val="000000"/>
+              </a:solidFill>
+            </a:endParaRPr>
+          </a:p>
+          <a:p>
+            <a:pPr indent="-311150" lvl="0" marL="457200" rtl="0" algn="l">
+              <a:spcBef>
+                <a:spcPts val="0"/>
+              </a:spcBef>
+              <a:spcAft>
+                <a:spcPts val="0"/>
+              </a:spcAft>
+              <a:buClr>
+                <a:srgbClr val="000000"/>
+              </a:buClr>
+              <a:buSzPts val="1300"/>
+              <a:buChar char="-"/>
+            </a:pPr>
+            <a:r>
+              <a:rPr lang="pt-PT">
+                <a:solidFill>
+                  <a:srgbClr val="000000"/>
+                </a:solidFill>
+              </a:rPr>
+              <a:t>e para finalizar ela também pode ser um número INT</a:t>
+            </a:r>
+            <a:br>
+              <a:rPr lang="pt-PT">
+                <a:solidFill>
+                  <a:srgbClr val="000000"/>
+                </a:solidFill>
+              </a:rPr>
+            </a:br>
+            <a:r>
+              <a:rPr lang="pt-PT">
+                <a:solidFill>
+                  <a:srgbClr val="000000"/>
+                </a:solidFill>
+              </a:rPr>
+              <a:t>como definimos</a:t>
+            </a:r>
+            <a:endParaRPr>
+              <a:solidFill>
+                <a:srgbClr val="000000"/>
+              </a:solidFill>
+            </a:endParaRPr>
           </a:p>
         </p:txBody>
       </p:sp>
+      <p:pic>
+        <p:nvPicPr>
+          <p:cNvPr id="152" name="Google Shape;152;p24"/>
+          <p:cNvPicPr preferRelativeResize="0"/>
+          <p:nvPr/>
+        </p:nvPicPr>
+        <p:blipFill>
+          <a:blip r:embed="rId3">
+            <a:alphaModFix/>
+          </a:blip>
+          <a:stretch>
+            <a:fillRect/>
+          </a:stretch>
+        </p:blipFill>
+        <p:spPr>
+          <a:xfrm>
+            <a:off x="5377538" y="2280725"/>
+            <a:ext cx="2847975" cy="1857375"/>
+          </a:xfrm>
+          <a:prstGeom prst="rect">
+            <a:avLst/>
+          </a:prstGeom>
+          <a:noFill/>
+          <a:ln>
+            <a:noFill/>
+          </a:ln>
+        </p:spPr>
+      </p:pic>
     </p:spTree>
   </p:cSld>
   <p:clrMapOvr>
@@ -9828,18 +10257,14 @@
             </a:endParaRPr>
           </a:p>
           <a:p>
-            <a:pPr indent="-311150" lvl="0" marL="457200" rtl="0" algn="l">
-              <a:spcBef>
-                <a:spcPts val="0"/>
-              </a:spcBef>
-              <a:spcAft>
-                <a:spcPts val="0"/>
-              </a:spcAft>
-              <a:buClr>
-                <a:srgbClr val="000000"/>
-              </a:buClr>
-              <a:buSzPts val="1300"/>
-              <a:buChar char="-"/>
+            <a:pPr indent="0" lvl="0" marL="457200" rtl="0" algn="l">
+              <a:spcBef>
+                <a:spcPts val="1600"/>
+              </a:spcBef>
+              <a:spcAft>
+                <a:spcPts val="1600"/>
+              </a:spcAft>
+              <a:buNone/>
             </a:pPr>
             <a:r>
               <a:t/>
@@ -10802,6 +11227,285 @@
 </file>
 
 <file path=ppt/theme/theme1.xml><?xml version="1.0" encoding="utf-8"?>
+<a:theme xmlns:a="http://schemas.openxmlformats.org/drawingml/2006/main" xmlns:r="http://schemas.openxmlformats.org/officeDocument/2006/relationships">
+  <a:themeElements>
+    <a:clrScheme name="Default">
+      <a:dk1>
+        <a:srgbClr val="000000"/>
+      </a:dk1>
+      <a:lt1>
+        <a:srgbClr val="FFFFFF"/>
+      </a:lt1>
+      <a:dk2>
+        <a:srgbClr val="158158"/>
+      </a:dk2>
+      <a:lt2>
+        <a:srgbClr val="F3F3F3"/>
+      </a:lt2>
+      <a:accent1>
+        <a:srgbClr val="058DC7"/>
+      </a:accent1>
+      <a:accent2>
+        <a:srgbClr val="50B432"/>
+      </a:accent2>
+      <a:accent3>
+        <a:srgbClr val="ED561B"/>
+      </a:accent3>
+      <a:accent4>
+        <a:srgbClr val="EDEF00"/>
+      </a:accent4>
+      <a:accent5>
+        <a:srgbClr val="24CBE5"/>
+      </a:accent5>
+      <a:accent6>
+        <a:srgbClr val="64E572"/>
+      </a:accent6>
+      <a:hlink>
+        <a:srgbClr val="2200CC"/>
+      </a:hlink>
+      <a:folHlink>
+        <a:srgbClr val="551A8B"/>
+      </a:folHlink>
+    </a:clrScheme>
+    <a:fontScheme name="Office">
+      <a:majorFont>
+        <a:latin typeface="Arial"/>
+        <a:ea typeface=""/>
+        <a:cs typeface=""/>
+        <a:font script="Jpan" typeface="ＭＳ Ｐゴシック"/>
+        <a:font script="Hang" typeface="맑은 고딕"/>
+        <a:font script="Hans" typeface="宋体"/>
+        <a:font script="Hant" typeface="新細明體"/>
+        <a:font script="Arab" typeface="Times New Roman"/>
+        <a:font script="Hebr" typeface="Times New Roman"/>
+        <a:font script="Thai" typeface="Angsana New"/>
+        <a:font script="Ethi" typeface="Nyala"/>
+        <a:font script="Beng" typeface="Vrinda"/>
+        <a:font script="Gujr" typeface="Shruti"/>
+        <a:font script="Khmr" typeface="MoolBoran"/>
+        <a:font script="Knda" typeface="Tunga"/>
+        <a:font script="Guru" typeface="Raavi"/>
+        <a:font script="Cans" typeface="Euphemia"/>
+        <a:font script="Cher" typeface="Plantagenet Cherokee"/>
+        <a:font script="Yiii" typeface="Microsoft Yi Baiti"/>
+        <a:font script="Tibt" typeface="Microsoft Himalaya"/>
+        <a:font script="Thaa" typeface="MV Boli"/>
+        <a:font script="Deva" typeface="Mangal"/>
+        <a:font script="Telu" typeface="Gautami"/>
+        <a:font script="Taml" typeface="Latha"/>
+        <a:font script="Syrc" typeface="Estrangelo Edessa"/>
+        <a:font script="Orya" typeface="Kalinga"/>
+        <a:font script="Mlym" typeface="Kartika"/>
+        <a:font script="Laoo" typeface="DokChampa"/>
+        <a:font script="Sinh" typeface="Iskoola Pota"/>
+        <a:font script="Mong" typeface="Mongolian Baiti"/>
+        <a:font script="Viet" typeface="Times New Roman"/>
+        <a:font script="Uigh" typeface="Microsoft Uighur"/>
+        <a:font script="Geor" typeface="Sylfaen"/>
+      </a:majorFont>
+      <a:minorFont>
+        <a:latin typeface="Arial"/>
+        <a:ea typeface=""/>
+        <a:cs typeface=""/>
+        <a:font script="Jpan" typeface="ＭＳ Ｐゴシック"/>
+        <a:font script="Hang" typeface="맑은 고딕"/>
+        <a:font script="Hans" typeface="宋体"/>
+        <a:font script="Hant" typeface="新細明體"/>
+        <a:font script="Arab" typeface="Arial"/>
+        <a:font script="Hebr" typeface="Arial"/>
+        <a:font script="Thai" typeface="Cordia New"/>
+        <a:font script="Ethi" typeface="Nyala"/>
+        <a:font script="Beng" typeface="Vrinda"/>
+        <a:font script="Gujr" typeface="Shruti"/>
+        <a:font script="Khmr" typeface="DaunPenh"/>
+        <a:font script="Knda" typeface="Tunga"/>
+        <a:font script="Guru" typeface="Raavi"/>
+        <a:font script="Cans" typeface="Euphemia"/>
+        <a:font script="Cher" typeface="Plantagenet Cherokee"/>
+        <a:font script="Yiii" typeface="Microsoft Yi Baiti"/>
+        <a:font script="Tibt" typeface="Microsoft Himalaya"/>
+        <a:font script="Thaa" typeface="MV Boli"/>
+        <a:font script="Deva" typeface="Mangal"/>
+        <a:font script="Telu" typeface="Gautami"/>
+        <a:font script="Taml" typeface="Latha"/>
+        <a:font script="Syrc" typeface="Estrangelo Edessa"/>
+        <a:font script="Orya" typeface="Kalinga"/>
+        <a:font script="Mlym" typeface="Kartika"/>
+        <a:font script="Laoo" typeface="DokChampa"/>
+        <a:font script="Sinh" typeface="Iskoola Pota"/>
+        <a:font script="Mong" typeface="Mongolian Baiti"/>
+        <a:font script="Viet" typeface="Arial"/>
+        <a:font script="Uigh" typeface="Microsoft Uighur"/>
+        <a:font script="Geor" typeface="Sylfaen"/>
+      </a:minorFont>
+    </a:fontScheme>
+    <a:fmtScheme name="Office">
+      <a:fillStyleLst>
+        <a:solidFill>
+          <a:schemeClr val="phClr"/>
+        </a:solidFill>
+        <a:gradFill rotWithShape="1">
+          <a:gsLst>
+            <a:gs pos="0">
+              <a:schemeClr val="phClr">
+                <a:tint val="50000"/>
+                <a:satMod val="300000"/>
+              </a:schemeClr>
+            </a:gs>
+            <a:gs pos="35000">
+              <a:schemeClr val="phClr">
+                <a:tint val="37000"/>
+                <a:satMod val="300000"/>
+              </a:schemeClr>
+            </a:gs>
+            <a:gs pos="100000">
+              <a:schemeClr val="phClr">
+                <a:tint val="15000"/>
+                <a:satMod val="350000"/>
+              </a:schemeClr>
+            </a:gs>
+          </a:gsLst>
+          <a:lin ang="16200000" scaled="1"/>
+        </a:gradFill>
+        <a:gradFill rotWithShape="1">
+          <a:gsLst>
+            <a:gs pos="0">
+              <a:schemeClr val="phClr">
+                <a:tint val="100000"/>
+                <a:shade val="100000"/>
+                <a:satMod val="130000"/>
+              </a:schemeClr>
+            </a:gs>
+            <a:gs pos="100000">
+              <a:schemeClr val="phClr">
+                <a:tint val="50000"/>
+                <a:shade val="100000"/>
+                <a:satMod val="350000"/>
+              </a:schemeClr>
+            </a:gs>
+          </a:gsLst>
+          <a:lin ang="16200000" scaled="0"/>
+        </a:gradFill>
+      </a:fillStyleLst>
+      <a:lnStyleLst>
+        <a:ln w="9525" cap="flat" cmpd="sng" algn="ctr">
+          <a:solidFill>
+            <a:schemeClr val="phClr">
+              <a:shade val="95000"/>
+              <a:satMod val="105000"/>
+            </a:schemeClr>
+          </a:solidFill>
+          <a:prstDash val="solid"/>
+        </a:ln>
+        <a:ln w="25400" cap="flat" cmpd="sng" algn="ctr">
+          <a:solidFill>
+            <a:schemeClr val="phClr"/>
+          </a:solidFill>
+          <a:prstDash val="solid"/>
+        </a:ln>
+        <a:ln w="38100" cap="flat" cmpd="sng" algn="ctr">
+          <a:solidFill>
+            <a:schemeClr val="phClr"/>
+          </a:solidFill>
+          <a:prstDash val="solid"/>
+        </a:ln>
+      </a:lnStyleLst>
+      <a:effectStyleLst>
+        <a:effectStyle>
+          <a:effectLst>
+            <a:outerShdw blurRad="40000" dist="20000" dir="5400000" rotWithShape="0">
+              <a:srgbClr val="000000">
+                <a:alpha val="38000"/>
+              </a:srgbClr>
+            </a:outerShdw>
+          </a:effectLst>
+        </a:effectStyle>
+        <a:effectStyle>
+          <a:effectLst>
+            <a:outerShdw blurRad="40000" dist="23000" dir="5400000" rotWithShape="0">
+              <a:srgbClr val="000000">
+                <a:alpha val="35000"/>
+              </a:srgbClr>
+            </a:outerShdw>
+          </a:effectLst>
+        </a:effectStyle>
+        <a:effectStyle>
+          <a:effectLst>
+            <a:outerShdw blurRad="40000" dist="23000" dir="5400000" rotWithShape="0">
+              <a:srgbClr val="000000">
+                <a:alpha val="35000"/>
+              </a:srgbClr>
+            </a:outerShdw>
+          </a:effectLst>
+          <a:scene3d>
+            <a:camera prst="orthographicFront">
+              <a:rot lat="0" lon="0" rev="0"/>
+            </a:camera>
+            <a:lightRig rig="threePt" dir="t">
+              <a:rot lat="0" lon="0" rev="1200000"/>
+            </a:lightRig>
+          </a:scene3d>
+          <a:sp3d>
+            <a:bevelT w="63500" h="25400"/>
+          </a:sp3d>
+        </a:effectStyle>
+      </a:effectStyleLst>
+      <a:bgFillStyleLst>
+        <a:solidFill>
+          <a:schemeClr val="phClr"/>
+        </a:solidFill>
+        <a:gradFill rotWithShape="1">
+          <a:gsLst>
+            <a:gs pos="0">
+              <a:schemeClr val="phClr">
+                <a:tint val="40000"/>
+                <a:satMod val="350000"/>
+              </a:schemeClr>
+            </a:gs>
+            <a:gs pos="40000">
+              <a:schemeClr val="phClr">
+                <a:tint val="45000"/>
+                <a:shade val="99000"/>
+                <a:satMod val="350000"/>
+              </a:schemeClr>
+            </a:gs>
+            <a:gs pos="100000">
+              <a:schemeClr val="phClr">
+                <a:shade val="20000"/>
+                <a:satMod val="255000"/>
+              </a:schemeClr>
+            </a:gs>
+          </a:gsLst>
+          <a:path path="circle">
+            <a:fillToRect l="50000" t="-80000" r="50000" b="180000"/>
+          </a:path>
+        </a:gradFill>
+        <a:gradFill rotWithShape="1">
+          <a:gsLst>
+            <a:gs pos="0">
+              <a:schemeClr val="phClr">
+                <a:tint val="80000"/>
+                <a:satMod val="300000"/>
+              </a:schemeClr>
+            </a:gs>
+            <a:gs pos="100000">
+              <a:schemeClr val="phClr">
+                <a:shade val="30000"/>
+                <a:satMod val="200000"/>
+              </a:schemeClr>
+            </a:gs>
+          </a:gsLst>
+          <a:path path="circle">
+            <a:fillToRect l="50000" t="50000" r="50000" b="50000"/>
+          </a:path>
+        </a:gradFill>
+      </a:bgFillStyleLst>
+    </a:fmtScheme>
+  </a:themeElements>
+</a:theme>
+</file>
+
+<file path=ppt/theme/theme2.xml><?xml version="1.0" encoding="utf-8"?>
 <a:theme xmlns:a="http://schemas.openxmlformats.org/drawingml/2006/main" xmlns:r="http://schemas.openxmlformats.org/officeDocument/2006/relationships" name="Streamline">
   <a:themeElements>
     <a:clrScheme name="Streamline">
@@ -11078,283 +11782,4 @@
     </a:fmtScheme>
   </a:themeElements>
 </a:theme>
-</file>
-
-<file path=ppt/theme/theme2.xml><?xml version="1.0" encoding="utf-8"?>
-<a:theme xmlns:a="http://schemas.openxmlformats.org/drawingml/2006/main" xmlns:r="http://schemas.openxmlformats.org/officeDocument/2006/relationships">
-  <a:themeElements>
-    <a:clrScheme name="Default">
-      <a:dk1>
-        <a:srgbClr val="000000"/>
-      </a:dk1>
-      <a:lt1>
-        <a:srgbClr val="FFFFFF"/>
-      </a:lt1>
-      <a:dk2>
-        <a:srgbClr val="158158"/>
-      </a:dk2>
-      <a:lt2>
-        <a:srgbClr val="F3F3F3"/>
-      </a:lt2>
-      <a:accent1>
-        <a:srgbClr val="058DC7"/>
-      </a:accent1>
-      <a:accent2>
-        <a:srgbClr val="50B432"/>
-      </a:accent2>
-      <a:accent3>
-        <a:srgbClr val="ED561B"/>
-      </a:accent3>
-      <a:accent4>
-        <a:srgbClr val="EDEF00"/>
-      </a:accent4>
-      <a:accent5>
-        <a:srgbClr val="24CBE5"/>
-      </a:accent5>
-      <a:accent6>
-        <a:srgbClr val="64E572"/>
-      </a:accent6>
-      <a:hlink>
-        <a:srgbClr val="2200CC"/>
-      </a:hlink>
-      <a:folHlink>
-        <a:srgbClr val="551A8B"/>
-      </a:folHlink>
-    </a:clrScheme>
-    <a:fontScheme name="Office">
-      <a:majorFont>
-        <a:latin typeface="Arial"/>
-        <a:ea typeface=""/>
-        <a:cs typeface=""/>
-        <a:font script="Jpan" typeface="ＭＳ Ｐゴシック"/>
-        <a:font script="Hang" typeface="맑은 고딕"/>
-        <a:font script="Hans" typeface="宋体"/>
-        <a:font script="Hant" typeface="新細明體"/>
-        <a:font script="Arab" typeface="Times New Roman"/>
-        <a:font script="Hebr" typeface="Times New Roman"/>
-        <a:font script="Thai" typeface="Angsana New"/>
-        <a:font script="Ethi" typeface="Nyala"/>
-        <a:font script="Beng" typeface="Vrinda"/>
-        <a:font script="Gujr" typeface="Shruti"/>
-        <a:font script="Khmr" typeface="MoolBoran"/>
-        <a:font script="Knda" typeface="Tunga"/>
-        <a:font script="Guru" typeface="Raavi"/>
-        <a:font script="Cans" typeface="Euphemia"/>
-        <a:font script="Cher" typeface="Plantagenet Cherokee"/>
-        <a:font script="Yiii" typeface="Microsoft Yi Baiti"/>
-        <a:font script="Tibt" typeface="Microsoft Himalaya"/>
-        <a:font script="Thaa" typeface="MV Boli"/>
-        <a:font script="Deva" typeface="Mangal"/>
-        <a:font script="Telu" typeface="Gautami"/>
-        <a:font script="Taml" typeface="Latha"/>
-        <a:font script="Syrc" typeface="Estrangelo Edessa"/>
-        <a:font script="Orya" typeface="Kalinga"/>
-        <a:font script="Mlym" typeface="Kartika"/>
-        <a:font script="Laoo" typeface="DokChampa"/>
-        <a:font script="Sinh" typeface="Iskoola Pota"/>
-        <a:font script="Mong" typeface="Mongolian Baiti"/>
-        <a:font script="Viet" typeface="Times New Roman"/>
-        <a:font script="Uigh" typeface="Microsoft Uighur"/>
-        <a:font script="Geor" typeface="Sylfaen"/>
-      </a:majorFont>
-      <a:minorFont>
-        <a:latin typeface="Arial"/>
-        <a:ea typeface=""/>
-        <a:cs typeface=""/>
-        <a:font script="Jpan" typeface="ＭＳ Ｐゴシック"/>
-        <a:font script="Hang" typeface="맑은 고딕"/>
-        <a:font script="Hans" typeface="宋体"/>
-        <a:font script="Hant" typeface="新細明體"/>
-        <a:font script="Arab" typeface="Arial"/>
-        <a:font script="Hebr" typeface="Arial"/>
-        <a:font script="Thai" typeface="Cordia New"/>
-        <a:font script="Ethi" typeface="Nyala"/>
-        <a:font script="Beng" typeface="Vrinda"/>
-        <a:font script="Gujr" typeface="Shruti"/>
-        <a:font script="Khmr" typeface="DaunPenh"/>
-        <a:font script="Knda" typeface="Tunga"/>
-        <a:font script="Guru" typeface="Raavi"/>
-        <a:font script="Cans" typeface="Euphemia"/>
-        <a:font script="Cher" typeface="Plantagenet Cherokee"/>
-        <a:font script="Yiii" typeface="Microsoft Yi Baiti"/>
-        <a:font script="Tibt" typeface="Microsoft Himalaya"/>
-        <a:font script="Thaa" typeface="MV Boli"/>
-        <a:font script="Deva" typeface="Mangal"/>
-        <a:font script="Telu" typeface="Gautami"/>
-        <a:font script="Taml" typeface="Latha"/>
-        <a:font script="Syrc" typeface="Estrangelo Edessa"/>
-        <a:font script="Orya" typeface="Kalinga"/>
-        <a:font script="Mlym" typeface="Kartika"/>
-        <a:font script="Laoo" typeface="DokChampa"/>
-        <a:font script="Sinh" typeface="Iskoola Pota"/>
-        <a:font script="Mong" typeface="Mongolian Baiti"/>
-        <a:font script="Viet" typeface="Arial"/>
-        <a:font script="Uigh" typeface="Microsoft Uighur"/>
-        <a:font script="Geor" typeface="Sylfaen"/>
-      </a:minorFont>
-    </a:fontScheme>
-    <a:fmtScheme name="Office">
-      <a:fillStyleLst>
-        <a:solidFill>
-          <a:schemeClr val="phClr"/>
-        </a:solidFill>
-        <a:gradFill rotWithShape="1">
-          <a:gsLst>
-            <a:gs pos="0">
-              <a:schemeClr val="phClr">
-                <a:tint val="50000"/>
-                <a:satMod val="300000"/>
-              </a:schemeClr>
-            </a:gs>
-            <a:gs pos="35000">
-              <a:schemeClr val="phClr">
-                <a:tint val="37000"/>
-                <a:satMod val="300000"/>
-              </a:schemeClr>
-            </a:gs>
-            <a:gs pos="100000">
-              <a:schemeClr val="phClr">
-                <a:tint val="15000"/>
-                <a:satMod val="350000"/>
-              </a:schemeClr>
-            </a:gs>
-          </a:gsLst>
-          <a:lin ang="16200000" scaled="1"/>
-        </a:gradFill>
-        <a:gradFill rotWithShape="1">
-          <a:gsLst>
-            <a:gs pos="0">
-              <a:schemeClr val="phClr">
-                <a:tint val="100000"/>
-                <a:shade val="100000"/>
-                <a:satMod val="130000"/>
-              </a:schemeClr>
-            </a:gs>
-            <a:gs pos="100000">
-              <a:schemeClr val="phClr">
-                <a:tint val="50000"/>
-                <a:shade val="100000"/>
-                <a:satMod val="350000"/>
-              </a:schemeClr>
-            </a:gs>
-          </a:gsLst>
-          <a:lin ang="16200000" scaled="0"/>
-        </a:gradFill>
-      </a:fillStyleLst>
-      <a:lnStyleLst>
-        <a:ln w="9525" cap="flat" cmpd="sng" algn="ctr">
-          <a:solidFill>
-            <a:schemeClr val="phClr">
-              <a:shade val="95000"/>
-              <a:satMod val="105000"/>
-            </a:schemeClr>
-          </a:solidFill>
-          <a:prstDash val="solid"/>
-        </a:ln>
-        <a:ln w="25400" cap="flat" cmpd="sng" algn="ctr">
-          <a:solidFill>
-            <a:schemeClr val="phClr"/>
-          </a:solidFill>
-          <a:prstDash val="solid"/>
-        </a:ln>
-        <a:ln w="38100" cap="flat" cmpd="sng" algn="ctr">
-          <a:solidFill>
-            <a:schemeClr val="phClr"/>
-          </a:solidFill>
-          <a:prstDash val="solid"/>
-        </a:ln>
-      </a:lnStyleLst>
-      <a:effectStyleLst>
-        <a:effectStyle>
-          <a:effectLst>
-            <a:outerShdw blurRad="40000" dist="20000" dir="5400000" rotWithShape="0">
-              <a:srgbClr val="000000">
-                <a:alpha val="38000"/>
-              </a:srgbClr>
-            </a:outerShdw>
-          </a:effectLst>
-        </a:effectStyle>
-        <a:effectStyle>
-          <a:effectLst>
-            <a:outerShdw blurRad="40000" dist="23000" dir="5400000" rotWithShape="0">
-              <a:srgbClr val="000000">
-                <a:alpha val="35000"/>
-              </a:srgbClr>
-            </a:outerShdw>
-          </a:effectLst>
-        </a:effectStyle>
-        <a:effectStyle>
-          <a:effectLst>
-            <a:outerShdw blurRad="40000" dist="23000" dir="5400000" rotWithShape="0">
-              <a:srgbClr val="000000">
-                <a:alpha val="35000"/>
-              </a:srgbClr>
-            </a:outerShdw>
-          </a:effectLst>
-          <a:scene3d>
-            <a:camera prst="orthographicFront">
-              <a:rot lat="0" lon="0" rev="0"/>
-            </a:camera>
-            <a:lightRig rig="threePt" dir="t">
-              <a:rot lat="0" lon="0" rev="1200000"/>
-            </a:lightRig>
-          </a:scene3d>
-          <a:sp3d>
-            <a:bevelT w="63500" h="25400"/>
-          </a:sp3d>
-        </a:effectStyle>
-      </a:effectStyleLst>
-      <a:bgFillStyleLst>
-        <a:solidFill>
-          <a:schemeClr val="phClr"/>
-        </a:solidFill>
-        <a:gradFill rotWithShape="1">
-          <a:gsLst>
-            <a:gs pos="0">
-              <a:schemeClr val="phClr">
-                <a:tint val="40000"/>
-                <a:satMod val="350000"/>
-              </a:schemeClr>
-            </a:gs>
-            <a:gs pos="40000">
-              <a:schemeClr val="phClr">
-                <a:tint val="45000"/>
-                <a:shade val="99000"/>
-                <a:satMod val="350000"/>
-              </a:schemeClr>
-            </a:gs>
-            <a:gs pos="100000">
-              <a:schemeClr val="phClr">
-                <a:shade val="20000"/>
-                <a:satMod val="255000"/>
-              </a:schemeClr>
-            </a:gs>
-          </a:gsLst>
-          <a:path path="circle">
-            <a:fillToRect l="50000" t="-80000" r="50000" b="180000"/>
-          </a:path>
-        </a:gradFill>
-        <a:gradFill rotWithShape="1">
-          <a:gsLst>
-            <a:gs pos="0">
-              <a:schemeClr val="phClr">
-                <a:tint val="80000"/>
-                <a:satMod val="300000"/>
-              </a:schemeClr>
-            </a:gs>
-            <a:gs pos="100000">
-              <a:schemeClr val="phClr">
-                <a:shade val="30000"/>
-                <a:satMod val="200000"/>
-              </a:schemeClr>
-            </a:gs>
-          </a:gsLst>
-          <a:path path="circle">
-            <a:fillToRect l="50000" t="50000" r="50000" b="50000"/>
-          </a:path>
-        </a:gradFill>
-      </a:bgFillStyleLst>
-    </a:fmtScheme>
-  </a:themeElements>
-</a:theme>
 </file>
</xml_diff>

<commit_message>
corrigindo pequenos erros e finalizando a apresentacao
</commit_message>
<xml_diff>
--- a/Apresentação ANTLR.pptx
+++ b/Apresentação ANTLR.pptx
@@ -19,28 +19,29 @@
     <p:sldId id="264" r:id="rId14"/>
     <p:sldId id="265" r:id="rId15"/>
     <p:sldId id="266" r:id="rId16"/>
+    <p:sldId id="267" r:id="rId17"/>
   </p:sldIdLst>
   <p:sldSz cy="5143500" cx="9144000"/>
   <p:notesSz cx="6858000" cy="9144000"/>
   <p:embeddedFontLst>
     <p:embeddedFont>
       <p:font typeface="Raleway"/>
-      <p:regular r:id="rId17"/>
-      <p:bold r:id="rId18"/>
-      <p:italic r:id="rId19"/>
-      <p:boldItalic r:id="rId20"/>
+      <p:regular r:id="rId18"/>
+      <p:bold r:id="rId19"/>
+      <p:italic r:id="rId20"/>
+      <p:boldItalic r:id="rId21"/>
     </p:embeddedFont>
     <p:embeddedFont>
       <p:font typeface="Lato"/>
-      <p:regular r:id="rId21"/>
-      <p:bold r:id="rId22"/>
-      <p:italic r:id="rId23"/>
-      <p:boldItalic r:id="rId24"/>
+      <p:regular r:id="rId22"/>
+      <p:bold r:id="rId23"/>
+      <p:italic r:id="rId24"/>
+      <p:boldItalic r:id="rId25"/>
     </p:embeddedFont>
     <p:embeddedFont>
       <p:font typeface="Oswald"/>
-      <p:regular r:id="rId25"/>
-      <p:bold r:id="rId26"/>
+      <p:regular r:id="rId26"/>
+      <p:bold r:id="rId27"/>
     </p:embeddedFont>
   </p:embeddedFontLst>
   <p:defaultTextStyle>
@@ -968,6 +969,105 @@
       <p:sp>
         <p:nvSpPr>
           <p:cNvPr id="148" name="Google Shape;148;g453053b84f_0_1136:notes"/>
+          <p:cNvSpPr txBox="1"/>
+          <p:nvPr>
+            <p:ph idx="1" type="body"/>
+          </p:nvPr>
+        </p:nvSpPr>
+        <p:spPr>
+          <a:xfrm>
+            <a:off x="685800" y="4343400"/>
+            <a:ext cx="5486400" cy="4114800"/>
+          </a:xfrm>
+          <a:prstGeom prst="rect">
+            <a:avLst/>
+          </a:prstGeom>
+        </p:spPr>
+        <p:txBody>
+          <a:bodyPr anchorCtr="0" anchor="t" bIns="91425" lIns="91425" spcFirstLastPara="1" rIns="91425" wrap="square" tIns="91425">
+            <a:noAutofit/>
+          </a:bodyPr>
+          <a:lstStyle/>
+          <a:p>
+            <a:pPr indent="0" lvl="0" marL="0" rtl="0" algn="l">
+              <a:spcBef>
+                <a:spcPts val="0"/>
+              </a:spcBef>
+              <a:spcAft>
+                <a:spcPts val="0"/>
+              </a:spcAft>
+              <a:buNone/>
+            </a:pPr>
+            <a:r>
+              <a:t/>
+            </a:r>
+            <a:endParaRPr/>
+          </a:p>
+        </p:txBody>
+      </p:sp>
+    </p:spTree>
+  </p:cSld>
+  <p:clrMapOvr>
+    <a:masterClrMapping/>
+  </p:clrMapOvr>
+</p:notes>
+</file>
+
+<file path=ppt/notesSlides/notesSlide12.xml><?xml version="1.0" encoding="utf-8"?>
+<p:notes xmlns:a="http://schemas.openxmlformats.org/drawingml/2006/main" xmlns:r="http://schemas.openxmlformats.org/officeDocument/2006/relationships" xmlns:mc="http://schemas.openxmlformats.org/markup-compatibility/2006" xmlns:mv="urn:schemas-microsoft-com:mac:vml" xmlns:p="http://schemas.openxmlformats.org/presentationml/2006/main" xmlns:c="http://schemas.openxmlformats.org/drawingml/2006/chart" xmlns:dgm="http://schemas.openxmlformats.org/drawingml/2006/diagram" xmlns:o="urn:schemas-microsoft-com:office:office" xmlns:v="urn:schemas-microsoft-com:vml" xmlns:pvml="urn:schemas-microsoft-com:office:powerpoint" xmlns:com="http://schemas.openxmlformats.org/drawingml/2006/compatibility" xmlns:p14="http://schemas.microsoft.com/office/powerpoint/2010/main" xmlns:p15="http://schemas.microsoft.com/office/powerpoint/2012/main" showMasterPhAnim="0" showMasterSp="0">
+  <p:cSld>
+    <p:spTree>
+      <p:nvGrpSpPr>
+        <p:cNvPr id="153" name="Shape 153"/>
+        <p:cNvGrpSpPr/>
+        <p:nvPr/>
+      </p:nvGrpSpPr>
+      <p:grpSpPr>
+        <a:xfrm>
+          <a:off x="0" y="0"/>
+          <a:ext cx="0" cy="0"/>
+          <a:chOff x="0" y="0"/>
+          <a:chExt cx="0" cy="0"/>
+        </a:xfrm>
+      </p:grpSpPr>
+      <p:sp>
+        <p:nvSpPr>
+          <p:cNvPr id="154" name="Google Shape;154;g453053b84f_2_3:notes"/>
+          <p:cNvSpPr/>
+          <p:nvPr>
+            <p:ph idx="2" type="sldImg"/>
+          </p:nvPr>
+        </p:nvSpPr>
+        <p:spPr>
+          <a:xfrm>
+            <a:off x="381300" y="685800"/>
+            <a:ext cx="6096000" cy="3429000"/>
+          </a:xfrm>
+          <a:custGeom>
+            <a:rect b="b" l="l" r="r" t="t"/>
+            <a:pathLst>
+              <a:path extrusionOk="0" h="120000" w="120000">
+                <a:moveTo>
+                  <a:pt x="0" y="0"/>
+                </a:moveTo>
+                <a:lnTo>
+                  <a:pt x="120000" y="0"/>
+                </a:lnTo>
+                <a:lnTo>
+                  <a:pt x="120000" y="120000"/>
+                </a:lnTo>
+                <a:lnTo>
+                  <a:pt x="0" y="120000"/>
+                </a:lnTo>
+                <a:close/>
+              </a:path>
+            </a:pathLst>
+          </a:custGeom>
+        </p:spPr>
+      </p:sp>
+      <p:sp>
+        <p:nvSpPr>
+          <p:cNvPr id="155" name="Google Shape;155;g453053b84f_2_3:notes"/>
           <p:cNvSpPr txBox="1"/>
           <p:nvPr>
             <p:ph idx="1" type="body"/>
@@ -9142,7 +9242,7 @@
             </a:r>
             <a:r>
               <a:rPr lang="pt-PT" sz="2400"/>
-              <a:t>, Kayo Martins, Murillo Gordo, Marco</a:t>
+              <a:t>, Murillo Gordo, Marco</a:t>
             </a:r>
             <a:r>
               <a:rPr lang="pt-PT" sz="2400"/>
@@ -9835,6 +9935,79 @@
 </p:sld>
 </file>
 
+<file path=ppt/slides/slide12.xml><?xml version="1.0" encoding="utf-8"?>
+<p:sld xmlns:a="http://schemas.openxmlformats.org/drawingml/2006/main" xmlns:r="http://schemas.openxmlformats.org/officeDocument/2006/relationships" xmlns:mc="http://schemas.openxmlformats.org/markup-compatibility/2006" xmlns:mv="urn:schemas-microsoft-com:mac:vml" xmlns:p="http://schemas.openxmlformats.org/presentationml/2006/main" xmlns:c="http://schemas.openxmlformats.org/drawingml/2006/chart" xmlns:dgm="http://schemas.openxmlformats.org/drawingml/2006/diagram" xmlns:o="urn:schemas-microsoft-com:office:office" xmlns:v="urn:schemas-microsoft-com:vml" xmlns:pvml="urn:schemas-microsoft-com:office:powerpoint" xmlns:com="http://schemas.openxmlformats.org/drawingml/2006/compatibility" xmlns:p14="http://schemas.microsoft.com/office/powerpoint/2010/main" xmlns:p15="http://schemas.microsoft.com/office/powerpoint/2012/main">
+  <p:cSld>
+    <p:spTree>
+      <p:nvGrpSpPr>
+        <p:cNvPr id="156" name="Shape 156"/>
+        <p:cNvGrpSpPr/>
+        <p:nvPr/>
+      </p:nvGrpSpPr>
+      <p:grpSpPr>
+        <a:xfrm>
+          <a:off x="0" y="0"/>
+          <a:ext cx="0" cy="0"/>
+          <a:chOff x="0" y="0"/>
+          <a:chExt cx="0" cy="0"/>
+        </a:xfrm>
+      </p:grpSpPr>
+      <p:sp>
+        <p:nvSpPr>
+          <p:cNvPr id="157" name="Google Shape;157;p25"/>
+          <p:cNvSpPr txBox="1"/>
+          <p:nvPr>
+            <p:ph type="title"/>
+          </p:nvPr>
+        </p:nvSpPr>
+        <p:spPr>
+          <a:xfrm>
+            <a:off x="729450" y="1322450"/>
+            <a:ext cx="7688400" cy="1518600"/>
+          </a:xfrm>
+          <a:prstGeom prst="rect">
+            <a:avLst/>
+          </a:prstGeom>
+        </p:spPr>
+        <p:txBody>
+          <a:bodyPr anchorCtr="0" anchor="t" bIns="91425" lIns="91425" spcFirstLastPara="1" rIns="91425" wrap="square" tIns="91425">
+            <a:noAutofit/>
+          </a:bodyPr>
+          <a:lstStyle/>
+          <a:p>
+            <a:pPr indent="0" lvl="0" marL="0" rtl="0" algn="l">
+              <a:spcBef>
+                <a:spcPts val="0"/>
+              </a:spcBef>
+              <a:spcAft>
+                <a:spcPts val="0"/>
+              </a:spcAft>
+              <a:buNone/>
+            </a:pPr>
+            <a:r>
+              <a:rPr lang="pt-PT">
+                <a:solidFill>
+                  <a:srgbClr val="000000"/>
+                </a:solidFill>
+              </a:rPr>
+              <a:t>Exemplo</a:t>
+            </a:r>
+            <a:endParaRPr>
+              <a:solidFill>
+                <a:srgbClr val="000000"/>
+              </a:solidFill>
+            </a:endParaRPr>
+          </a:p>
+        </p:txBody>
+      </p:sp>
+    </p:spTree>
+  </p:cSld>
+  <p:clrMapOvr>
+    <a:masterClrMapping/>
+  </p:clrMapOvr>
+</p:sld>
+</file>
+
 <file path=ppt/slides/slide2.xml><?xml version="1.0" encoding="utf-8"?>
 <p:sld xmlns:a="http://schemas.openxmlformats.org/drawingml/2006/main" xmlns:r="http://schemas.openxmlformats.org/officeDocument/2006/relationships" xmlns:mc="http://schemas.openxmlformats.org/markup-compatibility/2006" xmlns:mv="urn:schemas-microsoft-com:mac:vml" xmlns:p="http://schemas.openxmlformats.org/presentationml/2006/main" xmlns:c="http://schemas.openxmlformats.org/drawingml/2006/chart" xmlns:dgm="http://schemas.openxmlformats.org/drawingml/2006/diagram" xmlns:o="urn:schemas-microsoft-com:office:office" xmlns:v="urn:schemas-microsoft-com:vml" xmlns:pvml="urn:schemas-microsoft-com:office:powerpoint" xmlns:com="http://schemas.openxmlformats.org/drawingml/2006/compatibility" xmlns:p14="http://schemas.microsoft.com/office/powerpoint/2010/main" xmlns:p15="http://schemas.microsoft.com/office/powerpoint/2012/main">
   <p:cSld>
@@ -10002,7 +10175,7 @@
                   <a:srgbClr val="000000"/>
                 </a:solidFill>
               </a:rPr>
-              <a:t>Uso prático ANTLR funciona</a:t>
+              <a:t>Uso prático do ANTLR</a:t>
             </a:r>
             <a:endParaRPr sz="1800">
               <a:solidFill>
@@ -10248,7 +10421,7 @@
                   <a:srgbClr val="000000"/>
                 </a:solidFill>
               </a:rPr>
-              <a:t>mais fácil e menos limitado em relação a usar expressões regulares</a:t>
+              <a:t>mais fácil e menos limitado em relação ao uso de expressões regulares</a:t>
             </a:r>
             <a:endParaRPr>
               <a:solidFill>
@@ -11227,6 +11400,285 @@
 </file>
 
 <file path=ppt/theme/theme1.xml><?xml version="1.0" encoding="utf-8"?>
+<a:theme xmlns:a="http://schemas.openxmlformats.org/drawingml/2006/main" xmlns:r="http://schemas.openxmlformats.org/officeDocument/2006/relationships" name="Streamline">
+  <a:themeElements>
+    <a:clrScheme name="Streamline">
+      <a:dk1>
+        <a:srgbClr val="1A9988"/>
+      </a:dk1>
+      <a:lt1>
+        <a:srgbClr val="FFFFFF"/>
+      </a:lt1>
+      <a:dk2>
+        <a:srgbClr val="1A1A1A"/>
+      </a:dk2>
+      <a:lt2>
+        <a:srgbClr val="E9EDEE"/>
+      </a:lt2>
+      <a:accent1>
+        <a:srgbClr val="595959"/>
+      </a:accent1>
+      <a:accent2>
+        <a:srgbClr val="6AA4C8"/>
+      </a:accent2>
+      <a:accent3>
+        <a:srgbClr val="EB5600"/>
+      </a:accent3>
+      <a:accent4>
+        <a:srgbClr val="A2FFE8"/>
+      </a:accent4>
+      <a:accent5>
+        <a:srgbClr val="1C3678"/>
+      </a:accent5>
+      <a:accent6>
+        <a:srgbClr val="FFB8A2"/>
+      </a:accent6>
+      <a:hlink>
+        <a:srgbClr val="1C3678"/>
+      </a:hlink>
+      <a:folHlink>
+        <a:srgbClr val="1C3678"/>
+      </a:folHlink>
+    </a:clrScheme>
+    <a:fontScheme name="Office">
+      <a:majorFont>
+        <a:latin typeface="Arial"/>
+        <a:ea typeface=""/>
+        <a:cs typeface=""/>
+        <a:font script="Jpan" typeface="ＭＳ Ｐゴシック"/>
+        <a:font script="Hang" typeface="맑은 고딕"/>
+        <a:font script="Hans" typeface="宋体"/>
+        <a:font script="Hant" typeface="新細明體"/>
+        <a:font script="Arab" typeface="Times New Roman"/>
+        <a:font script="Hebr" typeface="Times New Roman"/>
+        <a:font script="Thai" typeface="Angsana New"/>
+        <a:font script="Ethi" typeface="Nyala"/>
+        <a:font script="Beng" typeface="Vrinda"/>
+        <a:font script="Gujr" typeface="Shruti"/>
+        <a:font script="Khmr" typeface="MoolBoran"/>
+        <a:font script="Knda" typeface="Tunga"/>
+        <a:font script="Guru" typeface="Raavi"/>
+        <a:font script="Cans" typeface="Euphemia"/>
+        <a:font script="Cher" typeface="Plantagenet Cherokee"/>
+        <a:font script="Yiii" typeface="Microsoft Yi Baiti"/>
+        <a:font script="Tibt" typeface="Microsoft Himalaya"/>
+        <a:font script="Thaa" typeface="MV Boli"/>
+        <a:font script="Deva" typeface="Mangal"/>
+        <a:font script="Telu" typeface="Gautami"/>
+        <a:font script="Taml" typeface="Latha"/>
+        <a:font script="Syrc" typeface="Estrangelo Edessa"/>
+        <a:font script="Orya" typeface="Kalinga"/>
+        <a:font script="Mlym" typeface="Kartika"/>
+        <a:font script="Laoo" typeface="DokChampa"/>
+        <a:font script="Sinh" typeface="Iskoola Pota"/>
+        <a:font script="Mong" typeface="Mongolian Baiti"/>
+        <a:font script="Viet" typeface="Times New Roman"/>
+        <a:font script="Uigh" typeface="Microsoft Uighur"/>
+        <a:font script="Geor" typeface="Sylfaen"/>
+      </a:majorFont>
+      <a:minorFont>
+        <a:latin typeface="Arial"/>
+        <a:ea typeface=""/>
+        <a:cs typeface=""/>
+        <a:font script="Jpan" typeface="ＭＳ Ｐゴシック"/>
+        <a:font script="Hang" typeface="맑은 고딕"/>
+        <a:font script="Hans" typeface="宋体"/>
+        <a:font script="Hant" typeface="新細明體"/>
+        <a:font script="Arab" typeface="Arial"/>
+        <a:font script="Hebr" typeface="Arial"/>
+        <a:font script="Thai" typeface="Cordia New"/>
+        <a:font script="Ethi" typeface="Nyala"/>
+        <a:font script="Beng" typeface="Vrinda"/>
+        <a:font script="Gujr" typeface="Shruti"/>
+        <a:font script="Khmr" typeface="DaunPenh"/>
+        <a:font script="Knda" typeface="Tunga"/>
+        <a:font script="Guru" typeface="Raavi"/>
+        <a:font script="Cans" typeface="Euphemia"/>
+        <a:font script="Cher" typeface="Plantagenet Cherokee"/>
+        <a:font script="Yiii" typeface="Microsoft Yi Baiti"/>
+        <a:font script="Tibt" typeface="Microsoft Himalaya"/>
+        <a:font script="Thaa" typeface="MV Boli"/>
+        <a:font script="Deva" typeface="Mangal"/>
+        <a:font script="Telu" typeface="Gautami"/>
+        <a:font script="Taml" typeface="Latha"/>
+        <a:font script="Syrc" typeface="Estrangelo Edessa"/>
+        <a:font script="Orya" typeface="Kalinga"/>
+        <a:font script="Mlym" typeface="Kartika"/>
+        <a:font script="Laoo" typeface="DokChampa"/>
+        <a:font script="Sinh" typeface="Iskoola Pota"/>
+        <a:font script="Mong" typeface="Mongolian Baiti"/>
+        <a:font script="Viet" typeface="Arial"/>
+        <a:font script="Uigh" typeface="Microsoft Uighur"/>
+        <a:font script="Geor" typeface="Sylfaen"/>
+      </a:minorFont>
+    </a:fontScheme>
+    <a:fmtScheme name="Office">
+      <a:fillStyleLst>
+        <a:solidFill>
+          <a:schemeClr val="phClr"/>
+        </a:solidFill>
+        <a:gradFill rotWithShape="1">
+          <a:gsLst>
+            <a:gs pos="0">
+              <a:schemeClr val="phClr">
+                <a:tint val="50000"/>
+                <a:satMod val="300000"/>
+              </a:schemeClr>
+            </a:gs>
+            <a:gs pos="35000">
+              <a:schemeClr val="phClr">
+                <a:tint val="37000"/>
+                <a:satMod val="300000"/>
+              </a:schemeClr>
+            </a:gs>
+            <a:gs pos="100000">
+              <a:schemeClr val="phClr">
+                <a:tint val="15000"/>
+                <a:satMod val="350000"/>
+              </a:schemeClr>
+            </a:gs>
+          </a:gsLst>
+          <a:lin ang="16200000" scaled="1"/>
+        </a:gradFill>
+        <a:gradFill rotWithShape="1">
+          <a:gsLst>
+            <a:gs pos="0">
+              <a:schemeClr val="phClr">
+                <a:tint val="100000"/>
+                <a:shade val="100000"/>
+                <a:satMod val="130000"/>
+              </a:schemeClr>
+            </a:gs>
+            <a:gs pos="100000">
+              <a:schemeClr val="phClr">
+                <a:tint val="50000"/>
+                <a:shade val="100000"/>
+                <a:satMod val="350000"/>
+              </a:schemeClr>
+            </a:gs>
+          </a:gsLst>
+          <a:lin ang="16200000" scaled="0"/>
+        </a:gradFill>
+      </a:fillStyleLst>
+      <a:lnStyleLst>
+        <a:ln w="9525" cap="flat" cmpd="sng" algn="ctr">
+          <a:solidFill>
+            <a:schemeClr val="phClr">
+              <a:shade val="95000"/>
+              <a:satMod val="105000"/>
+            </a:schemeClr>
+          </a:solidFill>
+          <a:prstDash val="solid"/>
+        </a:ln>
+        <a:ln w="25400" cap="flat" cmpd="sng" algn="ctr">
+          <a:solidFill>
+            <a:schemeClr val="phClr"/>
+          </a:solidFill>
+          <a:prstDash val="solid"/>
+        </a:ln>
+        <a:ln w="38100" cap="flat" cmpd="sng" algn="ctr">
+          <a:solidFill>
+            <a:schemeClr val="phClr"/>
+          </a:solidFill>
+          <a:prstDash val="solid"/>
+        </a:ln>
+      </a:lnStyleLst>
+      <a:effectStyleLst>
+        <a:effectStyle>
+          <a:effectLst>
+            <a:outerShdw blurRad="40000" dist="20000" dir="5400000" rotWithShape="0">
+              <a:srgbClr val="000000">
+                <a:alpha val="38000"/>
+              </a:srgbClr>
+            </a:outerShdw>
+          </a:effectLst>
+        </a:effectStyle>
+        <a:effectStyle>
+          <a:effectLst>
+            <a:outerShdw blurRad="40000" dist="23000" dir="5400000" rotWithShape="0">
+              <a:srgbClr val="000000">
+                <a:alpha val="35000"/>
+              </a:srgbClr>
+            </a:outerShdw>
+          </a:effectLst>
+        </a:effectStyle>
+        <a:effectStyle>
+          <a:effectLst>
+            <a:outerShdw blurRad="40000" dist="23000" dir="5400000" rotWithShape="0">
+              <a:srgbClr val="000000">
+                <a:alpha val="35000"/>
+              </a:srgbClr>
+            </a:outerShdw>
+          </a:effectLst>
+          <a:scene3d>
+            <a:camera prst="orthographicFront">
+              <a:rot lat="0" lon="0" rev="0"/>
+            </a:camera>
+            <a:lightRig rig="threePt" dir="t">
+              <a:rot lat="0" lon="0" rev="1200000"/>
+            </a:lightRig>
+          </a:scene3d>
+          <a:sp3d>
+            <a:bevelT w="63500" h="25400"/>
+          </a:sp3d>
+        </a:effectStyle>
+      </a:effectStyleLst>
+      <a:bgFillStyleLst>
+        <a:solidFill>
+          <a:schemeClr val="phClr"/>
+        </a:solidFill>
+        <a:gradFill rotWithShape="1">
+          <a:gsLst>
+            <a:gs pos="0">
+              <a:schemeClr val="phClr">
+                <a:tint val="40000"/>
+                <a:satMod val="350000"/>
+              </a:schemeClr>
+            </a:gs>
+            <a:gs pos="40000">
+              <a:schemeClr val="phClr">
+                <a:tint val="45000"/>
+                <a:shade val="99000"/>
+                <a:satMod val="350000"/>
+              </a:schemeClr>
+            </a:gs>
+            <a:gs pos="100000">
+              <a:schemeClr val="phClr">
+                <a:shade val="20000"/>
+                <a:satMod val="255000"/>
+              </a:schemeClr>
+            </a:gs>
+          </a:gsLst>
+          <a:path path="circle">
+            <a:fillToRect l="50000" t="-80000" r="50000" b="180000"/>
+          </a:path>
+        </a:gradFill>
+        <a:gradFill rotWithShape="1">
+          <a:gsLst>
+            <a:gs pos="0">
+              <a:schemeClr val="phClr">
+                <a:tint val="80000"/>
+                <a:satMod val="300000"/>
+              </a:schemeClr>
+            </a:gs>
+            <a:gs pos="100000">
+              <a:schemeClr val="phClr">
+                <a:shade val="30000"/>
+                <a:satMod val="200000"/>
+              </a:schemeClr>
+            </a:gs>
+          </a:gsLst>
+          <a:path path="circle">
+            <a:fillToRect l="50000" t="50000" r="50000" b="50000"/>
+          </a:path>
+        </a:gradFill>
+      </a:bgFillStyleLst>
+    </a:fmtScheme>
+  </a:themeElements>
+</a:theme>
+</file>
+
+<file path=ppt/theme/theme2.xml><?xml version="1.0" encoding="utf-8"?>
 <a:theme xmlns:a="http://schemas.openxmlformats.org/drawingml/2006/main" xmlns:r="http://schemas.openxmlformats.org/officeDocument/2006/relationships">
   <a:themeElements>
     <a:clrScheme name="Default">
@@ -11503,283 +11955,4 @@
     </a:fmtScheme>
   </a:themeElements>
 </a:theme>
-</file>
-
-<file path=ppt/theme/theme2.xml><?xml version="1.0" encoding="utf-8"?>
-<a:theme xmlns:a="http://schemas.openxmlformats.org/drawingml/2006/main" xmlns:r="http://schemas.openxmlformats.org/officeDocument/2006/relationships" name="Streamline">
-  <a:themeElements>
-    <a:clrScheme name="Streamline">
-      <a:dk1>
-        <a:srgbClr val="1A9988"/>
-      </a:dk1>
-      <a:lt1>
-        <a:srgbClr val="FFFFFF"/>
-      </a:lt1>
-      <a:dk2>
-        <a:srgbClr val="1A1A1A"/>
-      </a:dk2>
-      <a:lt2>
-        <a:srgbClr val="E9EDEE"/>
-      </a:lt2>
-      <a:accent1>
-        <a:srgbClr val="595959"/>
-      </a:accent1>
-      <a:accent2>
-        <a:srgbClr val="6AA4C8"/>
-      </a:accent2>
-      <a:accent3>
-        <a:srgbClr val="EB5600"/>
-      </a:accent3>
-      <a:accent4>
-        <a:srgbClr val="A2FFE8"/>
-      </a:accent4>
-      <a:accent5>
-        <a:srgbClr val="1C3678"/>
-      </a:accent5>
-      <a:accent6>
-        <a:srgbClr val="FFB8A2"/>
-      </a:accent6>
-      <a:hlink>
-        <a:srgbClr val="1C3678"/>
-      </a:hlink>
-      <a:folHlink>
-        <a:srgbClr val="1C3678"/>
-      </a:folHlink>
-    </a:clrScheme>
-    <a:fontScheme name="Office">
-      <a:majorFont>
-        <a:latin typeface="Arial"/>
-        <a:ea typeface=""/>
-        <a:cs typeface=""/>
-        <a:font script="Jpan" typeface="ＭＳ Ｐゴシック"/>
-        <a:font script="Hang" typeface="맑은 고딕"/>
-        <a:font script="Hans" typeface="宋体"/>
-        <a:font script="Hant" typeface="新細明體"/>
-        <a:font script="Arab" typeface="Times New Roman"/>
-        <a:font script="Hebr" typeface="Times New Roman"/>
-        <a:font script="Thai" typeface="Angsana New"/>
-        <a:font script="Ethi" typeface="Nyala"/>
-        <a:font script="Beng" typeface="Vrinda"/>
-        <a:font script="Gujr" typeface="Shruti"/>
-        <a:font script="Khmr" typeface="MoolBoran"/>
-        <a:font script="Knda" typeface="Tunga"/>
-        <a:font script="Guru" typeface="Raavi"/>
-        <a:font script="Cans" typeface="Euphemia"/>
-        <a:font script="Cher" typeface="Plantagenet Cherokee"/>
-        <a:font script="Yiii" typeface="Microsoft Yi Baiti"/>
-        <a:font script="Tibt" typeface="Microsoft Himalaya"/>
-        <a:font script="Thaa" typeface="MV Boli"/>
-        <a:font script="Deva" typeface="Mangal"/>
-        <a:font script="Telu" typeface="Gautami"/>
-        <a:font script="Taml" typeface="Latha"/>
-        <a:font script="Syrc" typeface="Estrangelo Edessa"/>
-        <a:font script="Orya" typeface="Kalinga"/>
-        <a:font script="Mlym" typeface="Kartika"/>
-        <a:font script="Laoo" typeface="DokChampa"/>
-        <a:font script="Sinh" typeface="Iskoola Pota"/>
-        <a:font script="Mong" typeface="Mongolian Baiti"/>
-        <a:font script="Viet" typeface="Times New Roman"/>
-        <a:font script="Uigh" typeface="Microsoft Uighur"/>
-        <a:font script="Geor" typeface="Sylfaen"/>
-      </a:majorFont>
-      <a:minorFont>
-        <a:latin typeface="Arial"/>
-        <a:ea typeface=""/>
-        <a:cs typeface=""/>
-        <a:font script="Jpan" typeface="ＭＳ Ｐゴシック"/>
-        <a:font script="Hang" typeface="맑은 고딕"/>
-        <a:font script="Hans" typeface="宋体"/>
-        <a:font script="Hant" typeface="新細明體"/>
-        <a:font script="Arab" typeface="Arial"/>
-        <a:font script="Hebr" typeface="Arial"/>
-        <a:font script="Thai" typeface="Cordia New"/>
-        <a:font script="Ethi" typeface="Nyala"/>
-        <a:font script="Beng" typeface="Vrinda"/>
-        <a:font script="Gujr" typeface="Shruti"/>
-        <a:font script="Khmr" typeface="DaunPenh"/>
-        <a:font script="Knda" typeface="Tunga"/>
-        <a:font script="Guru" typeface="Raavi"/>
-        <a:font script="Cans" typeface="Euphemia"/>
-        <a:font script="Cher" typeface="Plantagenet Cherokee"/>
-        <a:font script="Yiii" typeface="Microsoft Yi Baiti"/>
-        <a:font script="Tibt" typeface="Microsoft Himalaya"/>
-        <a:font script="Thaa" typeface="MV Boli"/>
-        <a:font script="Deva" typeface="Mangal"/>
-        <a:font script="Telu" typeface="Gautami"/>
-        <a:font script="Taml" typeface="Latha"/>
-        <a:font script="Syrc" typeface="Estrangelo Edessa"/>
-        <a:font script="Orya" typeface="Kalinga"/>
-        <a:font script="Mlym" typeface="Kartika"/>
-        <a:font script="Laoo" typeface="DokChampa"/>
-        <a:font script="Sinh" typeface="Iskoola Pota"/>
-        <a:font script="Mong" typeface="Mongolian Baiti"/>
-        <a:font script="Viet" typeface="Arial"/>
-        <a:font script="Uigh" typeface="Microsoft Uighur"/>
-        <a:font script="Geor" typeface="Sylfaen"/>
-      </a:minorFont>
-    </a:fontScheme>
-    <a:fmtScheme name="Office">
-      <a:fillStyleLst>
-        <a:solidFill>
-          <a:schemeClr val="phClr"/>
-        </a:solidFill>
-        <a:gradFill rotWithShape="1">
-          <a:gsLst>
-            <a:gs pos="0">
-              <a:schemeClr val="phClr">
-                <a:tint val="50000"/>
-                <a:satMod val="300000"/>
-              </a:schemeClr>
-            </a:gs>
-            <a:gs pos="35000">
-              <a:schemeClr val="phClr">
-                <a:tint val="37000"/>
-                <a:satMod val="300000"/>
-              </a:schemeClr>
-            </a:gs>
-            <a:gs pos="100000">
-              <a:schemeClr val="phClr">
-                <a:tint val="15000"/>
-                <a:satMod val="350000"/>
-              </a:schemeClr>
-            </a:gs>
-          </a:gsLst>
-          <a:lin ang="16200000" scaled="1"/>
-        </a:gradFill>
-        <a:gradFill rotWithShape="1">
-          <a:gsLst>
-            <a:gs pos="0">
-              <a:schemeClr val="phClr">
-                <a:tint val="100000"/>
-                <a:shade val="100000"/>
-                <a:satMod val="130000"/>
-              </a:schemeClr>
-            </a:gs>
-            <a:gs pos="100000">
-              <a:schemeClr val="phClr">
-                <a:tint val="50000"/>
-                <a:shade val="100000"/>
-                <a:satMod val="350000"/>
-              </a:schemeClr>
-            </a:gs>
-          </a:gsLst>
-          <a:lin ang="16200000" scaled="0"/>
-        </a:gradFill>
-      </a:fillStyleLst>
-      <a:lnStyleLst>
-        <a:ln w="9525" cap="flat" cmpd="sng" algn="ctr">
-          <a:solidFill>
-            <a:schemeClr val="phClr">
-              <a:shade val="95000"/>
-              <a:satMod val="105000"/>
-            </a:schemeClr>
-          </a:solidFill>
-          <a:prstDash val="solid"/>
-        </a:ln>
-        <a:ln w="25400" cap="flat" cmpd="sng" algn="ctr">
-          <a:solidFill>
-            <a:schemeClr val="phClr"/>
-          </a:solidFill>
-          <a:prstDash val="solid"/>
-        </a:ln>
-        <a:ln w="38100" cap="flat" cmpd="sng" algn="ctr">
-          <a:solidFill>
-            <a:schemeClr val="phClr"/>
-          </a:solidFill>
-          <a:prstDash val="solid"/>
-        </a:ln>
-      </a:lnStyleLst>
-      <a:effectStyleLst>
-        <a:effectStyle>
-          <a:effectLst>
-            <a:outerShdw blurRad="40000" dist="20000" dir="5400000" rotWithShape="0">
-              <a:srgbClr val="000000">
-                <a:alpha val="38000"/>
-              </a:srgbClr>
-            </a:outerShdw>
-          </a:effectLst>
-        </a:effectStyle>
-        <a:effectStyle>
-          <a:effectLst>
-            <a:outerShdw blurRad="40000" dist="23000" dir="5400000" rotWithShape="0">
-              <a:srgbClr val="000000">
-                <a:alpha val="35000"/>
-              </a:srgbClr>
-            </a:outerShdw>
-          </a:effectLst>
-        </a:effectStyle>
-        <a:effectStyle>
-          <a:effectLst>
-            <a:outerShdw blurRad="40000" dist="23000" dir="5400000" rotWithShape="0">
-              <a:srgbClr val="000000">
-                <a:alpha val="35000"/>
-              </a:srgbClr>
-            </a:outerShdw>
-          </a:effectLst>
-          <a:scene3d>
-            <a:camera prst="orthographicFront">
-              <a:rot lat="0" lon="0" rev="0"/>
-            </a:camera>
-            <a:lightRig rig="threePt" dir="t">
-              <a:rot lat="0" lon="0" rev="1200000"/>
-            </a:lightRig>
-          </a:scene3d>
-          <a:sp3d>
-            <a:bevelT w="63500" h="25400"/>
-          </a:sp3d>
-        </a:effectStyle>
-      </a:effectStyleLst>
-      <a:bgFillStyleLst>
-        <a:solidFill>
-          <a:schemeClr val="phClr"/>
-        </a:solidFill>
-        <a:gradFill rotWithShape="1">
-          <a:gsLst>
-            <a:gs pos="0">
-              <a:schemeClr val="phClr">
-                <a:tint val="40000"/>
-                <a:satMod val="350000"/>
-              </a:schemeClr>
-            </a:gs>
-            <a:gs pos="40000">
-              <a:schemeClr val="phClr">
-                <a:tint val="45000"/>
-                <a:shade val="99000"/>
-                <a:satMod val="350000"/>
-              </a:schemeClr>
-            </a:gs>
-            <a:gs pos="100000">
-              <a:schemeClr val="phClr">
-                <a:shade val="20000"/>
-                <a:satMod val="255000"/>
-              </a:schemeClr>
-            </a:gs>
-          </a:gsLst>
-          <a:path path="circle">
-            <a:fillToRect l="50000" t="-80000" r="50000" b="180000"/>
-          </a:path>
-        </a:gradFill>
-        <a:gradFill rotWithShape="1">
-          <a:gsLst>
-            <a:gs pos="0">
-              <a:schemeClr val="phClr">
-                <a:tint val="80000"/>
-                <a:satMod val="300000"/>
-              </a:schemeClr>
-            </a:gs>
-            <a:gs pos="100000">
-              <a:schemeClr val="phClr">
-                <a:shade val="30000"/>
-                <a:satMod val="200000"/>
-              </a:schemeClr>
-            </a:gs>
-          </a:gsLst>
-          <a:path path="circle">
-            <a:fillToRect l="50000" t="50000" r="50000" b="50000"/>
-          </a:path>
-        </a:gradFill>
-      </a:bgFillStyleLst>
-    </a:fmtScheme>
-  </a:themeElements>
-</a:theme>
 </file>
</xml_diff>